<commit_message>
All tests green for LMST
</commit_message>
<xml_diff>
--- a/de.tudarmstadt.maki.tc.cbctc.algorithms/instances/testgraphs.pptx
+++ b/de.tudarmstadt.maki.tc.cbctc.algorithms/instances/testgraphs.pptx
@@ -17,9 +17,10 @@
     <p:sldId id="268" r:id="rId11"/>
     <p:sldId id="269" r:id="rId12"/>
     <p:sldId id="270" r:id="rId13"/>
-    <p:sldId id="259" r:id="rId14"/>
-    <p:sldId id="260" r:id="rId15"/>
-    <p:sldId id="267" r:id="rId16"/>
+    <p:sldId id="271" r:id="rId14"/>
+    <p:sldId id="259" r:id="rId15"/>
+    <p:sldId id="260" r:id="rId16"/>
+    <p:sldId id="267" r:id="rId17"/>
   </p:sldIdLst>
   <p:sldSz cx="12192000" cy="6858000"/>
   <p:notesSz cx="6858000" cy="9144000"/>
@@ -135,6 +136,7 @@
             <p14:sldId id="268"/>
             <p14:sldId id="269"/>
             <p14:sldId id="270"/>
+            <p14:sldId id="271"/>
           </p14:sldIdLst>
         </p14:section>
         <p14:section name="Testgraphs for e-kTC" id="{893D8346-A827-4FEC-9989-0B78EDAA378C}">
@@ -295,7 +297,7 @@
           <a:p>
             <a:fld id="{AA2F2A37-85DD-45B9-AC18-C6701B3AEA4C}" type="datetimeFigureOut">
               <a:rPr lang="en-US" smtClean="0"/>
-              <a:t>7/26/2017</a:t>
+              <a:t>7/31/2017</a:t>
             </a:fld>
             <a:endParaRPr lang="en-US"/>
           </a:p>
@@ -548,7 +550,7 @@
           <a:p>
             <a:fld id="{AA2F2A37-85DD-45B9-AC18-C6701B3AEA4C}" type="datetimeFigureOut">
               <a:rPr lang="en-US" smtClean="0"/>
-              <a:t>7/26/2017</a:t>
+              <a:t>7/31/2017</a:t>
             </a:fld>
             <a:endParaRPr lang="en-US"/>
           </a:p>
@@ -718,7 +720,7 @@
           <a:p>
             <a:fld id="{AA2F2A37-85DD-45B9-AC18-C6701B3AEA4C}" type="datetimeFigureOut">
               <a:rPr lang="en-US" smtClean="0"/>
-              <a:t>7/26/2017</a:t>
+              <a:t>7/31/2017</a:t>
             </a:fld>
             <a:endParaRPr lang="en-US"/>
           </a:p>
@@ -898,7 +900,7 @@
           <a:p>
             <a:fld id="{AA2F2A37-85DD-45B9-AC18-C6701B3AEA4C}" type="datetimeFigureOut">
               <a:rPr lang="en-US" smtClean="0"/>
-              <a:t>7/26/2017</a:t>
+              <a:t>7/31/2017</a:t>
             </a:fld>
             <a:endParaRPr lang="en-US"/>
           </a:p>
@@ -1068,7 +1070,7 @@
           <a:p>
             <a:fld id="{AA2F2A37-85DD-45B9-AC18-C6701B3AEA4C}" type="datetimeFigureOut">
               <a:rPr lang="en-US" smtClean="0"/>
-              <a:t>7/26/2017</a:t>
+              <a:t>7/31/2017</a:t>
             </a:fld>
             <a:endParaRPr lang="en-US"/>
           </a:p>
@@ -1257,7 +1259,7 @@
           <a:p>
             <a:fld id="{AA2F2A37-85DD-45B9-AC18-C6701B3AEA4C}" type="datetimeFigureOut">
               <a:rPr lang="en-US" smtClean="0"/>
-              <a:t>7/26/2017</a:t>
+              <a:t>7/31/2017</a:t>
             </a:fld>
             <a:endParaRPr lang="en-US"/>
           </a:p>
@@ -1510,7 +1512,7 @@
           <a:p>
             <a:fld id="{AA2F2A37-85DD-45B9-AC18-C6701B3AEA4C}" type="datetimeFigureOut">
               <a:rPr lang="en-US" smtClean="0"/>
-              <a:t>7/26/2017</a:t>
+              <a:t>7/31/2017</a:t>
             </a:fld>
             <a:endParaRPr lang="en-US"/>
           </a:p>
@@ -1742,7 +1744,7 @@
           <a:p>
             <a:fld id="{AA2F2A37-85DD-45B9-AC18-C6701B3AEA4C}" type="datetimeFigureOut">
               <a:rPr lang="en-US" smtClean="0"/>
-              <a:t>7/26/2017</a:t>
+              <a:t>7/31/2017</a:t>
             </a:fld>
             <a:endParaRPr lang="en-US"/>
           </a:p>
@@ -2109,7 +2111,7 @@
           <a:p>
             <a:fld id="{AA2F2A37-85DD-45B9-AC18-C6701B3AEA4C}" type="datetimeFigureOut">
               <a:rPr lang="en-US" smtClean="0"/>
-              <a:t>7/26/2017</a:t>
+              <a:t>7/31/2017</a:t>
             </a:fld>
             <a:endParaRPr lang="en-US"/>
           </a:p>
@@ -2227,7 +2229,7 @@
           <a:p>
             <a:fld id="{AA2F2A37-85DD-45B9-AC18-C6701B3AEA4C}" type="datetimeFigureOut">
               <a:rPr lang="en-US" smtClean="0"/>
-              <a:t>7/26/2017</a:t>
+              <a:t>7/31/2017</a:t>
             </a:fld>
             <a:endParaRPr lang="en-US"/>
           </a:p>
@@ -2329,7 +2331,7 @@
           <a:p>
             <a:fld id="{AA2F2A37-85DD-45B9-AC18-C6701B3AEA4C}" type="datetimeFigureOut">
               <a:rPr lang="en-US" smtClean="0"/>
-              <a:t>7/26/2017</a:t>
+              <a:t>7/31/2017</a:t>
             </a:fld>
             <a:endParaRPr lang="en-US"/>
           </a:p>
@@ -2606,7 +2608,7 @@
           <a:p>
             <a:fld id="{AA2F2A37-85DD-45B9-AC18-C6701B3AEA4C}" type="datetimeFigureOut">
               <a:rPr lang="en-US" smtClean="0"/>
-              <a:t>7/26/2017</a:t>
+              <a:t>7/31/2017</a:t>
             </a:fld>
             <a:endParaRPr lang="en-US"/>
           </a:p>
@@ -2819,7 +2821,7 @@
           <a:p>
             <a:fld id="{AA2F2A37-85DD-45B9-AC18-C6701B3AEA4C}" type="datetimeFigureOut">
               <a:rPr lang="en-US" smtClean="0"/>
-              <a:t>7/26/2017</a:t>
+              <a:t>7/31/2017</a:t>
             </a:fld>
             <a:endParaRPr lang="en-US"/>
           </a:p>
@@ -5613,11 +5615,7 @@
             </a:r>
             <a:r>
               <a:rPr lang="en-US" smtClean="0"/>
-              <a:t> </a:t>
-            </a:r>
-            <a:r>
-              <a:rPr lang="en-US" smtClean="0"/>
-              <a:t>D8</a:t>
+              <a:t> D8</a:t>
             </a:r>
             <a:endParaRPr lang="en-US" dirty="0"/>
           </a:p>
@@ -5652,15 +5650,7 @@
           <a:p>
             <a:r>
               <a:rPr lang="en-US" smtClean="0"/>
-              <a:t>n=11</a:t>
-            </a:r>
-            <a:r>
-              <a:rPr lang="en-US" smtClean="0"/>
-              <a:t>, </a:t>
-            </a:r>
-            <a:r>
-              <a:rPr lang="en-US" smtClean="0"/>
-              <a:t>m=19*2=38</a:t>
+              <a:t>n=11, m=19*2=38</a:t>
             </a:r>
             <a:endParaRPr lang="en-US" dirty="0" smtClean="0"/>
           </a:p>
@@ -7657,11 +7647,7 @@
             </a:r>
             <a:r>
               <a:rPr lang="en-US" smtClean="0"/>
-              <a:t> </a:t>
-            </a:r>
-            <a:r>
-              <a:rPr lang="en-US" smtClean="0"/>
-              <a:t>D8</a:t>
+              <a:t> D8</a:t>
             </a:r>
             <a:endParaRPr lang="en-US" dirty="0"/>
           </a:p>
@@ -7697,11 +7683,7 @@
             </a:r>
             <a:r>
               <a:rPr lang="en-US" smtClean="0"/>
-              <a:t>after </a:t>
-            </a:r>
-            <a:r>
-              <a:rPr lang="en-US" smtClean="0"/>
-              <a:t>GMST iteration:</a:t>
+              <a:t>after GMST iteration:</a:t>
             </a:r>
             <a:br>
               <a:rPr lang="en-US" smtClean="0"/>
@@ -9700,12 +9682,12 @@
           <a:lstStyle/>
           <a:p>
             <a:r>
-              <a:rPr lang="en-US" dirty="0" err="1" smtClean="0"/>
+              <a:rPr lang="en-US" err="1" smtClean="0"/>
               <a:t>Testgraph</a:t>
             </a:r>
             <a:r>
-              <a:rPr lang="en-US" dirty="0" smtClean="0"/>
-              <a:t> E1</a:t>
+              <a:rPr lang="en-US" smtClean="0"/>
+              <a:t> D8</a:t>
             </a:r>
             <a:endParaRPr lang="en-US" dirty="0"/>
           </a:p>
@@ -9721,641 +9703,1994 @@
             <p:ph idx="1"/>
           </p:nvPr>
         </p:nvSpPr>
-        <p:spPr/>
+        <p:spPr>
+          <a:xfrm>
+            <a:off x="838200" y="1825625"/>
+            <a:ext cx="4631344" cy="4351338"/>
+          </a:xfrm>
+        </p:spPr>
         <p:txBody>
           <a:bodyPr/>
           <a:lstStyle/>
           <a:p>
             <a:r>
               <a:rPr lang="en-US" smtClean="0"/>
-              <a:t>Simple test case for e-ktc</a:t>
-            </a:r>
-          </a:p>
-          <a:p>
+              <a:t>Active </a:t>
+            </a:r>
+            <a:r>
+              <a:rPr lang="en-US" dirty="0" smtClean="0"/>
+              <a:t>links </a:t>
+            </a:r>
             <a:r>
               <a:rPr lang="en-US" smtClean="0"/>
-              <a:t>Cases (k=1.5)</a:t>
-            </a:r>
-          </a:p>
-          <a:p>
-            <a:pPr lvl="1"/>
+              <a:t>after </a:t>
+            </a:r>
             <a:r>
               <a:rPr lang="en-US" smtClean="0"/>
-              <a:t>e13-e12-e23 =&gt; I</a:t>
-            </a:r>
-          </a:p>
-          <a:p>
-            <a:pPr lvl="1"/>
+              <a:t>L</a:t>
+            </a:r>
             <a:r>
               <a:rPr lang="en-US" smtClean="0"/>
-              <a:t>e32-e21-e13 =&gt; A</a:t>
-            </a:r>
-          </a:p>
-          <a:p>
-            <a:pPr lvl="1"/>
+              <a:t>MST (k=2) </a:t>
+            </a:r>
             <a:r>
               <a:rPr lang="en-US" smtClean="0"/>
-              <a:t>e21-e23-e31 =&gt; A</a:t>
-            </a:r>
-          </a:p>
-          <a:p>
-            <a:pPr lvl="1"/>
-            <a:r>
+              <a:t>iteration:</a:t>
+            </a:r>
+            <a:br>
               <a:rPr lang="en-US" smtClean="0"/>
-              <a:t>e31-e32-e21 =&gt; A</a:t>
-            </a:r>
-          </a:p>
-          <a:p>
-            <a:pPr lvl="1"/>
+            </a:br>
             <a:r>
               <a:rPr lang="en-US" smtClean="0"/>
-              <a:t>e12-e13-e32 =&gt; A</a:t>
-            </a:r>
-          </a:p>
-          <a:p>
-            <a:pPr lvl="1"/>
+              <a:t>e1-2,e1-7,e2-3,e3-4,e3-10,e4-5,e5-6,e7-8,e8-9,e9-10,e10-11</a:t>
+            </a:r>
+          </a:p>
+          <a:p>
             <a:r>
               <a:rPr lang="en-US" smtClean="0"/>
-              <a:t>e23-e21-e13 =&gt; A</a:t>
-            </a:r>
-            <a:endParaRPr lang="en-US" dirty="0" smtClean="0"/>
+              <a:t>N.B. In contrast to GMST, e7-8 is active because its local view is not sufficient to discover the path n3-n10-n9-n8</a:t>
+            </a:r>
+            <a:endParaRPr lang="en-US" dirty="0"/>
           </a:p>
         </p:txBody>
       </p:sp>
-      <p:sp>
-        <p:nvSpPr>
-          <p:cNvPr id="4" name="Ellipse 3"/>
-          <p:cNvSpPr/>
+      <p:grpSp>
+        <p:nvGrpSpPr>
+          <p:cNvPr id="126" name="Kanten"/>
+          <p:cNvGrpSpPr/>
           <p:nvPr/>
-        </p:nvSpPr>
-        <p:spPr>
+        </p:nvGrpSpPr>
+        <p:grpSpPr>
           <a:xfrm>
-            <a:off x="7301925" y="2144069"/>
-            <a:ext cx="328474" cy="328474"/>
+            <a:off x="5461970" y="834661"/>
+            <a:ext cx="3644037" cy="5389351"/>
+            <a:chOff x="5461970" y="834661"/>
+            <a:chExt cx="3644037" cy="5389351"/>
           </a:xfrm>
-          <a:prstGeom prst="ellipse">
-            <a:avLst/>
-          </a:prstGeom>
-          <a:solidFill>
-            <a:schemeClr val="tx1"/>
-          </a:solidFill>
-        </p:spPr>
-        <p:style>
-          <a:lnRef idx="2">
-            <a:schemeClr val="accent1">
-              <a:shade val="50000"/>
-            </a:schemeClr>
-          </a:lnRef>
-          <a:fillRef idx="1">
-            <a:schemeClr val="accent1"/>
-          </a:fillRef>
-          <a:effectRef idx="0">
-            <a:schemeClr val="accent1"/>
-          </a:effectRef>
-          <a:fontRef idx="minor">
-            <a:schemeClr val="lt1"/>
-          </a:fontRef>
-        </p:style>
-        <p:txBody>
-          <a:bodyPr rtlCol="0" anchor="ctr"/>
-          <a:lstStyle/>
-          <a:p>
-            <a:pPr algn="ctr"/>
-            <a:r>
-              <a:rPr lang="en-US" dirty="0" smtClean="0"/>
-              <a:t>1</a:t>
-            </a:r>
-            <a:endParaRPr lang="en-US" dirty="0"/>
-          </a:p>
-        </p:txBody>
-      </p:sp>
-      <p:sp>
-        <p:nvSpPr>
-          <p:cNvPr id="5" name="Ellipse 4"/>
-          <p:cNvSpPr/>
+        </p:grpSpPr>
+        <p:cxnSp>
+          <p:nvCxnSpPr>
+            <p:cNvPr id="6" name="Gerader Verbinder 5"/>
+            <p:cNvCxnSpPr>
+              <a:stCxn id="4" idx="7"/>
+              <a:endCxn id="5" idx="3"/>
+            </p:cNvCxnSpPr>
+            <p:nvPr/>
+          </p:nvCxnSpPr>
+          <p:spPr>
+            <a:xfrm flipV="1">
+              <a:off x="5461970" y="3940411"/>
+              <a:ext cx="428373" cy="520893"/>
+            </a:xfrm>
+            <a:prstGeom prst="line">
+              <a:avLst/>
+            </a:prstGeom>
+            <a:ln w="38100">
+              <a:solidFill>
+                <a:schemeClr val="tx1"/>
+              </a:solidFill>
+              <a:prstDash val="dash"/>
+            </a:ln>
+          </p:spPr>
+          <p:style>
+            <a:lnRef idx="1">
+              <a:schemeClr val="accent1"/>
+            </a:lnRef>
+            <a:fillRef idx="0">
+              <a:schemeClr val="accent1"/>
+            </a:fillRef>
+            <a:effectRef idx="0">
+              <a:schemeClr val="accent1"/>
+            </a:effectRef>
+            <a:fontRef idx="minor">
+              <a:schemeClr val="tx1"/>
+            </a:fontRef>
+          </p:style>
+        </p:cxnSp>
+        <p:cxnSp>
+          <p:nvCxnSpPr>
+            <p:cNvPr id="14" name="Gerader Verbinder 13"/>
+            <p:cNvCxnSpPr>
+              <a:stCxn id="5" idx="0"/>
+              <a:endCxn id="13" idx="3"/>
+            </p:cNvCxnSpPr>
+            <p:nvPr/>
+          </p:nvCxnSpPr>
+          <p:spPr>
+            <a:xfrm flipV="1">
+              <a:off x="6006476" y="950794"/>
+              <a:ext cx="665115" cy="2709247"/>
+            </a:xfrm>
+            <a:prstGeom prst="line">
+              <a:avLst/>
+            </a:prstGeom>
+            <a:ln w="38100">
+              <a:solidFill>
+                <a:schemeClr val="tx1"/>
+              </a:solidFill>
+              <a:prstDash val="dash"/>
+            </a:ln>
+          </p:spPr>
+          <p:style>
+            <a:lnRef idx="1">
+              <a:schemeClr val="accent1"/>
+            </a:lnRef>
+            <a:fillRef idx="0">
+              <a:schemeClr val="accent1"/>
+            </a:fillRef>
+            <a:effectRef idx="0">
+              <a:schemeClr val="accent1"/>
+            </a:effectRef>
+            <a:fontRef idx="minor">
+              <a:schemeClr val="tx1"/>
+            </a:fontRef>
+          </p:style>
+        </p:cxnSp>
+        <p:cxnSp>
+          <p:nvCxnSpPr>
+            <p:cNvPr id="17" name="Gerader Verbinder 16"/>
+            <p:cNvCxnSpPr>
+              <a:stCxn id="13" idx="6"/>
+              <a:endCxn id="12" idx="1"/>
+            </p:cNvCxnSpPr>
+            <p:nvPr/>
+          </p:nvCxnSpPr>
+          <p:spPr>
+            <a:xfrm>
+              <a:off x="6951961" y="834661"/>
+              <a:ext cx="1085648" cy="1198356"/>
+            </a:xfrm>
+            <a:prstGeom prst="line">
+              <a:avLst/>
+            </a:prstGeom>
+            <a:ln w="38100">
+              <a:solidFill>
+                <a:schemeClr val="tx1"/>
+              </a:solidFill>
+              <a:prstDash val="dash"/>
+            </a:ln>
+          </p:spPr>
+          <p:style>
+            <a:lnRef idx="1">
+              <a:schemeClr val="accent1"/>
+            </a:lnRef>
+            <a:fillRef idx="0">
+              <a:schemeClr val="accent1"/>
+            </a:fillRef>
+            <a:effectRef idx="0">
+              <a:schemeClr val="accent1"/>
+            </a:effectRef>
+            <a:fontRef idx="minor">
+              <a:schemeClr val="tx1"/>
+            </a:fontRef>
+          </p:style>
+        </p:cxnSp>
+        <p:cxnSp>
+          <p:nvCxnSpPr>
+            <p:cNvPr id="20" name="Gerader Verbinder 19"/>
+            <p:cNvCxnSpPr>
+              <a:stCxn id="12" idx="3"/>
+              <a:endCxn id="11" idx="0"/>
+            </p:cNvCxnSpPr>
+            <p:nvPr/>
+          </p:nvCxnSpPr>
+          <p:spPr>
+            <a:xfrm flipH="1">
+              <a:off x="7400831" y="2265283"/>
+              <a:ext cx="636778" cy="1249378"/>
+            </a:xfrm>
+            <a:prstGeom prst="line">
+              <a:avLst/>
+            </a:prstGeom>
+            <a:ln w="38100">
+              <a:solidFill>
+                <a:schemeClr val="tx1"/>
+              </a:solidFill>
+              <a:prstDash val="dash"/>
+            </a:ln>
+          </p:spPr>
+          <p:style>
+            <a:lnRef idx="1">
+              <a:schemeClr val="accent1"/>
+            </a:lnRef>
+            <a:fillRef idx="0">
+              <a:schemeClr val="accent1"/>
+            </a:fillRef>
+            <a:effectRef idx="0">
+              <a:schemeClr val="accent1"/>
+            </a:effectRef>
+            <a:fontRef idx="minor">
+              <a:schemeClr val="tx1"/>
+            </a:fontRef>
+          </p:style>
+        </p:cxnSp>
+        <p:cxnSp>
+          <p:nvCxnSpPr>
+            <p:cNvPr id="23" name="Gerader Verbinder 22"/>
+            <p:cNvCxnSpPr>
+              <a:stCxn id="12" idx="2"/>
+              <a:endCxn id="5" idx="7"/>
+            </p:cNvCxnSpPr>
+            <p:nvPr/>
+          </p:nvCxnSpPr>
+          <p:spPr>
+            <a:xfrm flipH="1">
+              <a:off x="6122609" y="2149150"/>
+              <a:ext cx="1866896" cy="1558995"/>
+            </a:xfrm>
+            <a:prstGeom prst="line">
+              <a:avLst/>
+            </a:prstGeom>
+            <a:ln w="38100">
+              <a:solidFill>
+                <a:schemeClr val="tx1"/>
+              </a:solidFill>
+              <a:prstDash val="dash"/>
+            </a:ln>
+          </p:spPr>
+          <p:style>
+            <a:lnRef idx="1">
+              <a:schemeClr val="accent1"/>
+            </a:lnRef>
+            <a:fillRef idx="0">
+              <a:schemeClr val="accent1"/>
+            </a:fillRef>
+            <a:effectRef idx="0">
+              <a:schemeClr val="accent1"/>
+            </a:effectRef>
+            <a:fontRef idx="minor">
+              <a:schemeClr val="tx1"/>
+            </a:fontRef>
+          </p:style>
+        </p:cxnSp>
+        <p:cxnSp>
+          <p:nvCxnSpPr>
+            <p:cNvPr id="26" name="Gerader Verbinder 25"/>
+            <p:cNvCxnSpPr>
+              <a:stCxn id="5" idx="6"/>
+              <a:endCxn id="11" idx="3"/>
+            </p:cNvCxnSpPr>
+            <p:nvPr/>
+          </p:nvCxnSpPr>
+          <p:spPr>
+            <a:xfrm flipV="1">
+              <a:off x="6170713" y="3795031"/>
+              <a:ext cx="1113985" cy="29247"/>
+            </a:xfrm>
+            <a:prstGeom prst="line">
+              <a:avLst/>
+            </a:prstGeom>
+            <a:ln w="38100">
+              <a:solidFill>
+                <a:schemeClr val="tx1"/>
+              </a:solidFill>
+              <a:prstDash val="dash"/>
+            </a:ln>
+          </p:spPr>
+          <p:style>
+            <a:lnRef idx="1">
+              <a:schemeClr val="accent1"/>
+            </a:lnRef>
+            <a:fillRef idx="0">
+              <a:schemeClr val="accent1"/>
+            </a:fillRef>
+            <a:effectRef idx="0">
+              <a:schemeClr val="accent1"/>
+            </a:effectRef>
+            <a:fontRef idx="minor">
+              <a:schemeClr val="tx1"/>
+            </a:fontRef>
+          </p:style>
+        </p:cxnSp>
+        <p:cxnSp>
+          <p:nvCxnSpPr>
+            <p:cNvPr id="29" name="Gerader Verbinder 28"/>
+            <p:cNvCxnSpPr>
+              <a:stCxn id="9" idx="7"/>
+              <a:endCxn id="11" idx="3"/>
+            </p:cNvCxnSpPr>
+            <p:nvPr/>
+          </p:nvCxnSpPr>
+          <p:spPr>
+            <a:xfrm flipV="1">
+              <a:off x="6711889" y="3795031"/>
+              <a:ext cx="572809" cy="622934"/>
+            </a:xfrm>
+            <a:prstGeom prst="line">
+              <a:avLst/>
+            </a:prstGeom>
+            <a:ln w="38100">
+              <a:solidFill>
+                <a:schemeClr val="tx1"/>
+              </a:solidFill>
+              <a:prstDash val="dash"/>
+            </a:ln>
+          </p:spPr>
+          <p:style>
+            <a:lnRef idx="1">
+              <a:schemeClr val="accent1"/>
+            </a:lnRef>
+            <a:fillRef idx="0">
+              <a:schemeClr val="accent1"/>
+            </a:fillRef>
+            <a:effectRef idx="0">
+              <a:schemeClr val="accent1"/>
+            </a:effectRef>
+            <a:fontRef idx="minor">
+              <a:schemeClr val="tx1"/>
+            </a:fontRef>
+          </p:style>
+        </p:cxnSp>
+        <p:cxnSp>
+          <p:nvCxnSpPr>
+            <p:cNvPr id="32" name="Gerader Verbinder 31"/>
+            <p:cNvCxnSpPr>
+              <a:stCxn id="5" idx="5"/>
+              <a:endCxn id="9" idx="1"/>
+            </p:cNvCxnSpPr>
+            <p:nvPr/>
+          </p:nvCxnSpPr>
+          <p:spPr>
+            <a:xfrm>
+              <a:off x="6122609" y="3940411"/>
+              <a:ext cx="357014" cy="477554"/>
+            </a:xfrm>
+            <a:prstGeom prst="line">
+              <a:avLst/>
+            </a:prstGeom>
+            <a:ln w="38100">
+              <a:solidFill>
+                <a:schemeClr val="tx1"/>
+              </a:solidFill>
+              <a:prstDash val="dash"/>
+            </a:ln>
+          </p:spPr>
+          <p:style>
+            <a:lnRef idx="1">
+              <a:schemeClr val="accent1"/>
+            </a:lnRef>
+            <a:fillRef idx="0">
+              <a:schemeClr val="accent1"/>
+            </a:fillRef>
+            <a:effectRef idx="0">
+              <a:schemeClr val="accent1"/>
+            </a:effectRef>
+            <a:fontRef idx="minor">
+              <a:schemeClr val="tx1"/>
+            </a:fontRef>
+          </p:style>
+        </p:cxnSp>
+        <p:cxnSp>
+          <p:nvCxnSpPr>
+            <p:cNvPr id="35" name="Gerader Verbinder 34"/>
+            <p:cNvCxnSpPr>
+              <a:stCxn id="9" idx="2"/>
+              <a:endCxn id="4" idx="6"/>
+            </p:cNvCxnSpPr>
+            <p:nvPr/>
+          </p:nvCxnSpPr>
+          <p:spPr>
+            <a:xfrm flipH="1">
+              <a:off x="5510074" y="4534098"/>
+              <a:ext cx="921445" cy="43339"/>
+            </a:xfrm>
+            <a:prstGeom prst="line">
+              <a:avLst/>
+            </a:prstGeom>
+            <a:ln w="38100">
+              <a:solidFill>
+                <a:schemeClr val="tx1"/>
+              </a:solidFill>
+              <a:prstDash val="dash"/>
+            </a:ln>
+          </p:spPr>
+          <p:style>
+            <a:lnRef idx="1">
+              <a:schemeClr val="accent1"/>
+            </a:lnRef>
+            <a:fillRef idx="0">
+              <a:schemeClr val="accent1"/>
+            </a:fillRef>
+            <a:effectRef idx="0">
+              <a:schemeClr val="accent1"/>
+            </a:effectRef>
+            <a:fontRef idx="minor">
+              <a:schemeClr val="tx1"/>
+            </a:fontRef>
+          </p:style>
+        </p:cxnSp>
+        <p:cxnSp>
+          <p:nvCxnSpPr>
+            <p:cNvPr id="38" name="Gerader Verbinder 37"/>
+            <p:cNvCxnSpPr>
+              <a:stCxn id="10" idx="1"/>
+              <a:endCxn id="4" idx="5"/>
+            </p:cNvCxnSpPr>
+            <p:nvPr/>
+          </p:nvCxnSpPr>
+          <p:spPr>
+            <a:xfrm flipH="1" flipV="1">
+              <a:off x="5461970" y="4693570"/>
+              <a:ext cx="428373" cy="474855"/>
+            </a:xfrm>
+            <a:prstGeom prst="line">
+              <a:avLst/>
+            </a:prstGeom>
+            <a:ln w="38100">
+              <a:solidFill>
+                <a:schemeClr val="tx1"/>
+              </a:solidFill>
+              <a:prstDash val="dash"/>
+            </a:ln>
+          </p:spPr>
+          <p:style>
+            <a:lnRef idx="1">
+              <a:schemeClr val="accent1"/>
+            </a:lnRef>
+            <a:fillRef idx="0">
+              <a:schemeClr val="accent1"/>
+            </a:fillRef>
+            <a:effectRef idx="0">
+              <a:schemeClr val="accent1"/>
+            </a:effectRef>
+            <a:fontRef idx="minor">
+              <a:schemeClr val="tx1"/>
+            </a:fontRef>
+          </p:style>
+        </p:cxnSp>
+        <p:cxnSp>
+          <p:nvCxnSpPr>
+            <p:cNvPr id="41" name="Gerader Verbinder 40"/>
+            <p:cNvCxnSpPr>
+              <a:stCxn id="10" idx="0"/>
+              <a:endCxn id="9" idx="3"/>
+            </p:cNvCxnSpPr>
+            <p:nvPr/>
+          </p:nvCxnSpPr>
+          <p:spPr>
+            <a:xfrm flipV="1">
+              <a:off x="6006476" y="4650231"/>
+              <a:ext cx="473147" cy="470090"/>
+            </a:xfrm>
+            <a:prstGeom prst="line">
+              <a:avLst/>
+            </a:prstGeom>
+            <a:ln w="38100">
+              <a:solidFill>
+                <a:schemeClr val="tx1"/>
+              </a:solidFill>
+              <a:prstDash val="dash"/>
+            </a:ln>
+          </p:spPr>
+          <p:style>
+            <a:lnRef idx="1">
+              <a:schemeClr val="accent1"/>
+            </a:lnRef>
+            <a:fillRef idx="0">
+              <a:schemeClr val="accent1"/>
+            </a:fillRef>
+            <a:effectRef idx="0">
+              <a:schemeClr val="accent1"/>
+            </a:effectRef>
+            <a:fontRef idx="minor">
+              <a:schemeClr val="tx1"/>
+            </a:fontRef>
+          </p:style>
+        </p:cxnSp>
+        <p:cxnSp>
+          <p:nvCxnSpPr>
+            <p:cNvPr id="44" name="Gerader Verbinder 43"/>
+            <p:cNvCxnSpPr>
+              <a:stCxn id="10" idx="4"/>
+              <a:endCxn id="45" idx="1"/>
+            </p:cNvCxnSpPr>
+            <p:nvPr/>
+          </p:nvCxnSpPr>
+          <p:spPr>
+            <a:xfrm>
+              <a:off x="6006476" y="5448795"/>
+              <a:ext cx="525156" cy="659084"/>
+            </a:xfrm>
+            <a:prstGeom prst="line">
+              <a:avLst/>
+            </a:prstGeom>
+            <a:ln w="38100">
+              <a:solidFill>
+                <a:schemeClr val="tx1"/>
+              </a:solidFill>
+              <a:prstDash val="dash"/>
+            </a:ln>
+          </p:spPr>
+          <p:style>
+            <a:lnRef idx="1">
+              <a:schemeClr val="accent1"/>
+            </a:lnRef>
+            <a:fillRef idx="0">
+              <a:schemeClr val="accent1"/>
+            </a:fillRef>
+            <a:effectRef idx="0">
+              <a:schemeClr val="accent1"/>
+            </a:effectRef>
+            <a:fontRef idx="minor">
+              <a:schemeClr val="tx1"/>
+            </a:fontRef>
+          </p:style>
+        </p:cxnSp>
+        <p:cxnSp>
+          <p:nvCxnSpPr>
+            <p:cNvPr id="49" name="Gerader Verbinder 48"/>
+            <p:cNvCxnSpPr>
+              <a:stCxn id="46" idx="3"/>
+              <a:endCxn id="45" idx="6"/>
+            </p:cNvCxnSpPr>
+            <p:nvPr/>
+          </p:nvCxnSpPr>
+          <p:spPr>
+            <a:xfrm flipH="1">
+              <a:off x="6812002" y="6011671"/>
+              <a:ext cx="886311" cy="212341"/>
+            </a:xfrm>
+            <a:prstGeom prst="line">
+              <a:avLst/>
+            </a:prstGeom>
+            <a:ln w="38100">
+              <a:solidFill>
+                <a:schemeClr val="tx1"/>
+              </a:solidFill>
+              <a:prstDash val="dash"/>
+            </a:ln>
+          </p:spPr>
+          <p:style>
+            <a:lnRef idx="1">
+              <a:schemeClr val="accent1"/>
+            </a:lnRef>
+            <a:fillRef idx="0">
+              <a:schemeClr val="accent1"/>
+            </a:fillRef>
+            <a:effectRef idx="0">
+              <a:schemeClr val="accent1"/>
+            </a:effectRef>
+            <a:fontRef idx="minor">
+              <a:schemeClr val="tx1"/>
+            </a:fontRef>
+          </p:style>
+        </p:cxnSp>
+        <p:cxnSp>
+          <p:nvCxnSpPr>
+            <p:cNvPr id="52" name="Gerader Verbinder 51"/>
+            <p:cNvCxnSpPr>
+              <a:stCxn id="46" idx="1"/>
+              <a:endCxn id="9" idx="5"/>
+            </p:cNvCxnSpPr>
+            <p:nvPr/>
+          </p:nvCxnSpPr>
+          <p:spPr>
+            <a:xfrm flipH="1" flipV="1">
+              <a:off x="6711889" y="4650231"/>
+              <a:ext cx="986424" cy="1129174"/>
+            </a:xfrm>
+            <a:prstGeom prst="line">
+              <a:avLst/>
+            </a:prstGeom>
+            <a:ln w="38100">
+              <a:solidFill>
+                <a:schemeClr val="tx1"/>
+              </a:solidFill>
+              <a:prstDash val="dash"/>
+            </a:ln>
+          </p:spPr>
+          <p:style>
+            <a:lnRef idx="1">
+              <a:schemeClr val="accent1"/>
+            </a:lnRef>
+            <a:fillRef idx="0">
+              <a:schemeClr val="accent1"/>
+            </a:fillRef>
+            <a:effectRef idx="0">
+              <a:schemeClr val="accent1"/>
+            </a:effectRef>
+            <a:fontRef idx="minor">
+              <a:schemeClr val="tx1"/>
+            </a:fontRef>
+          </p:style>
+        </p:cxnSp>
+        <p:cxnSp>
+          <p:nvCxnSpPr>
+            <p:cNvPr id="55" name="Gerader Verbinder 54"/>
+            <p:cNvCxnSpPr>
+              <a:stCxn id="59" idx="2"/>
+              <a:endCxn id="9" idx="6"/>
+            </p:cNvCxnSpPr>
+            <p:nvPr/>
+          </p:nvCxnSpPr>
+          <p:spPr>
+            <a:xfrm flipH="1">
+              <a:off x="6759993" y="4007372"/>
+              <a:ext cx="2181777" cy="526726"/>
+            </a:xfrm>
+            <a:prstGeom prst="line">
+              <a:avLst/>
+            </a:prstGeom>
+            <a:ln w="38100">
+              <a:solidFill>
+                <a:schemeClr val="tx1"/>
+              </a:solidFill>
+              <a:prstDash val="dash"/>
+            </a:ln>
+          </p:spPr>
+          <p:style>
+            <a:lnRef idx="1">
+              <a:schemeClr val="accent1"/>
+            </a:lnRef>
+            <a:fillRef idx="0">
+              <a:schemeClr val="accent1"/>
+            </a:fillRef>
+            <a:effectRef idx="0">
+              <a:schemeClr val="accent1"/>
+            </a:effectRef>
+            <a:fontRef idx="minor">
+              <a:schemeClr val="tx1"/>
+            </a:fontRef>
+          </p:style>
+        </p:cxnSp>
+        <p:cxnSp>
+          <p:nvCxnSpPr>
+            <p:cNvPr id="61" name="Gerader Verbinder 60"/>
+            <p:cNvCxnSpPr>
+              <a:stCxn id="59" idx="4"/>
+              <a:endCxn id="46" idx="7"/>
+            </p:cNvCxnSpPr>
+            <p:nvPr/>
+          </p:nvCxnSpPr>
+          <p:spPr>
+            <a:xfrm flipH="1">
+              <a:off x="7930579" y="4171609"/>
+              <a:ext cx="1175428" cy="1607796"/>
+            </a:xfrm>
+            <a:prstGeom prst="line">
+              <a:avLst/>
+            </a:prstGeom>
+            <a:ln w="38100">
+              <a:solidFill>
+                <a:schemeClr val="tx1"/>
+              </a:solidFill>
+              <a:prstDash val="dash"/>
+            </a:ln>
+          </p:spPr>
+          <p:style>
+            <a:lnRef idx="1">
+              <a:schemeClr val="accent1"/>
+            </a:lnRef>
+            <a:fillRef idx="0">
+              <a:schemeClr val="accent1"/>
+            </a:fillRef>
+            <a:effectRef idx="0">
+              <a:schemeClr val="accent1"/>
+            </a:effectRef>
+            <a:fontRef idx="minor">
+              <a:schemeClr val="tx1"/>
+            </a:fontRef>
+          </p:style>
+        </p:cxnSp>
+        <p:cxnSp>
+          <p:nvCxnSpPr>
+            <p:cNvPr id="64" name="Gerader Verbinder 63"/>
+            <p:cNvCxnSpPr>
+              <a:stCxn id="59" idx="3"/>
+              <a:endCxn id="58" idx="7"/>
+            </p:cNvCxnSpPr>
+            <p:nvPr/>
+          </p:nvCxnSpPr>
+          <p:spPr>
+            <a:xfrm flipH="1">
+              <a:off x="8134289" y="4123505"/>
+              <a:ext cx="855585" cy="527122"/>
+            </a:xfrm>
+            <a:prstGeom prst="line">
+              <a:avLst/>
+            </a:prstGeom>
+            <a:ln w="38100">
+              <a:solidFill>
+                <a:schemeClr val="tx1"/>
+              </a:solidFill>
+              <a:prstDash val="dash"/>
+            </a:ln>
+          </p:spPr>
+          <p:style>
+            <a:lnRef idx="1">
+              <a:schemeClr val="accent1"/>
+            </a:lnRef>
+            <a:fillRef idx="0">
+              <a:schemeClr val="accent1"/>
+            </a:fillRef>
+            <a:effectRef idx="0">
+              <a:schemeClr val="accent1"/>
+            </a:effectRef>
+            <a:fontRef idx="minor">
+              <a:schemeClr val="tx1"/>
+            </a:fontRef>
+          </p:style>
+        </p:cxnSp>
+        <p:cxnSp>
+          <p:nvCxnSpPr>
+            <p:cNvPr id="67" name="Gerader Verbinder 66"/>
+            <p:cNvCxnSpPr>
+              <a:stCxn id="58" idx="2"/>
+            </p:cNvCxnSpPr>
+            <p:nvPr/>
+          </p:nvCxnSpPr>
+          <p:spPr>
+            <a:xfrm flipH="1" flipV="1">
+              <a:off x="6695098" y="4591651"/>
+              <a:ext cx="1158821" cy="175109"/>
+            </a:xfrm>
+            <a:prstGeom prst="line">
+              <a:avLst/>
+            </a:prstGeom>
+            <a:ln w="38100">
+              <a:solidFill>
+                <a:schemeClr val="tx1"/>
+              </a:solidFill>
+              <a:prstDash val="dash"/>
+            </a:ln>
+          </p:spPr>
+          <p:style>
+            <a:lnRef idx="1">
+              <a:schemeClr val="accent1"/>
+            </a:lnRef>
+            <a:fillRef idx="0">
+              <a:schemeClr val="accent1"/>
+            </a:fillRef>
+            <a:effectRef idx="0">
+              <a:schemeClr val="accent1"/>
+            </a:effectRef>
+            <a:fontRef idx="minor">
+              <a:schemeClr val="tx1"/>
+            </a:fontRef>
+          </p:style>
+        </p:cxnSp>
+        <p:cxnSp>
+          <p:nvCxnSpPr>
+            <p:cNvPr id="70" name="Gerader Verbinder 69"/>
+            <p:cNvCxnSpPr>
+              <a:stCxn id="58" idx="4"/>
+              <a:endCxn id="46" idx="0"/>
+            </p:cNvCxnSpPr>
+            <p:nvPr/>
+          </p:nvCxnSpPr>
+          <p:spPr>
+            <a:xfrm flipH="1">
+              <a:off x="7814446" y="4930997"/>
+              <a:ext cx="203710" cy="800304"/>
+            </a:xfrm>
+            <a:prstGeom prst="line">
+              <a:avLst/>
+            </a:prstGeom>
+            <a:ln w="38100">
+              <a:solidFill>
+                <a:schemeClr val="tx1"/>
+              </a:solidFill>
+              <a:prstDash val="dash"/>
+            </a:ln>
+          </p:spPr>
+          <p:style>
+            <a:lnRef idx="1">
+              <a:schemeClr val="accent1"/>
+            </a:lnRef>
+            <a:fillRef idx="0">
+              <a:schemeClr val="accent1"/>
+            </a:fillRef>
+            <a:effectRef idx="0">
+              <a:schemeClr val="accent1"/>
+            </a:effectRef>
+            <a:fontRef idx="minor">
+              <a:schemeClr val="tx1"/>
+            </a:fontRef>
+          </p:style>
+        </p:cxnSp>
+      </p:grpSp>
+      <p:grpSp>
+        <p:nvGrpSpPr>
+          <p:cNvPr id="144" name="Knoten"/>
+          <p:cNvGrpSpPr/>
           <p:nvPr/>
-        </p:nvSpPr>
-        <p:spPr>
+        </p:nvGrpSpPr>
+        <p:grpSpPr>
           <a:xfrm>
-            <a:off x="8231819" y="845564"/>
-            <a:ext cx="328474" cy="328474"/>
+            <a:off x="5181600" y="670424"/>
+            <a:ext cx="4088644" cy="5717825"/>
+            <a:chOff x="838200" y="559293"/>
+            <a:chExt cx="4088644" cy="5717825"/>
           </a:xfrm>
-          <a:prstGeom prst="ellipse">
-            <a:avLst/>
-          </a:prstGeom>
-          <a:solidFill>
-            <a:schemeClr val="tx1"/>
-          </a:solidFill>
-        </p:spPr>
-        <p:style>
-          <a:lnRef idx="2">
-            <a:schemeClr val="accent1">
-              <a:shade val="50000"/>
-            </a:schemeClr>
-          </a:lnRef>
-          <a:fillRef idx="1">
-            <a:schemeClr val="accent1"/>
-          </a:fillRef>
-          <a:effectRef idx="0">
-            <a:schemeClr val="accent1"/>
-          </a:effectRef>
-          <a:fontRef idx="minor">
-            <a:schemeClr val="lt1"/>
-          </a:fontRef>
-        </p:style>
-        <p:txBody>
-          <a:bodyPr rtlCol="0" anchor="ctr"/>
-          <a:lstStyle/>
-          <a:p>
-            <a:pPr algn="ctr"/>
-            <a:r>
-              <a:rPr lang="en-US" dirty="0"/>
-              <a:t>2</a:t>
-            </a:r>
-          </a:p>
-        </p:txBody>
-      </p:sp>
-      <p:sp>
-        <p:nvSpPr>
-          <p:cNvPr id="6" name="Ellipse 5"/>
-          <p:cNvSpPr/>
+        </p:grpSpPr>
+        <p:sp>
+          <p:nvSpPr>
+            <p:cNvPr id="4" name="Ellipse 3"/>
+            <p:cNvSpPr/>
+            <p:nvPr/>
+          </p:nvSpPr>
+          <p:spPr>
+            <a:xfrm>
+              <a:off x="838200" y="4302069"/>
+              <a:ext cx="328474" cy="328474"/>
+            </a:xfrm>
+            <a:prstGeom prst="ellipse">
+              <a:avLst/>
+            </a:prstGeom>
+            <a:solidFill>
+              <a:schemeClr val="tx1"/>
+            </a:solidFill>
+            <a:ln>
+              <a:solidFill>
+                <a:schemeClr val="tx1"/>
+              </a:solidFill>
+            </a:ln>
+          </p:spPr>
+          <p:style>
+            <a:lnRef idx="2">
+              <a:schemeClr val="accent1">
+                <a:shade val="50000"/>
+              </a:schemeClr>
+            </a:lnRef>
+            <a:fillRef idx="1">
+              <a:schemeClr val="accent1"/>
+            </a:fillRef>
+            <a:effectRef idx="0">
+              <a:schemeClr val="accent1"/>
+            </a:effectRef>
+            <a:fontRef idx="minor">
+              <a:schemeClr val="lt1"/>
+            </a:fontRef>
+          </p:style>
+          <p:txBody>
+            <a:bodyPr rtlCol="0" anchor="ctr"/>
+            <a:lstStyle/>
+            <a:p>
+              <a:pPr algn="ctr"/>
+              <a:r>
+                <a:rPr lang="en-US" dirty="0" smtClean="0"/>
+                <a:t>1</a:t>
+              </a:r>
+              <a:endParaRPr lang="en-US" dirty="0"/>
+            </a:p>
+          </p:txBody>
+        </p:sp>
+        <p:sp>
+          <p:nvSpPr>
+            <p:cNvPr id="5" name="Ellipse 4"/>
+            <p:cNvSpPr/>
+            <p:nvPr/>
+          </p:nvSpPr>
+          <p:spPr>
+            <a:xfrm>
+              <a:off x="1498839" y="3548910"/>
+              <a:ext cx="328474" cy="328474"/>
+            </a:xfrm>
+            <a:prstGeom prst="ellipse">
+              <a:avLst/>
+            </a:prstGeom>
+            <a:solidFill>
+              <a:schemeClr val="tx1"/>
+            </a:solidFill>
+            <a:ln>
+              <a:solidFill>
+                <a:schemeClr val="tx1"/>
+              </a:solidFill>
+            </a:ln>
+          </p:spPr>
+          <p:style>
+            <a:lnRef idx="2">
+              <a:schemeClr val="accent1">
+                <a:shade val="50000"/>
+              </a:schemeClr>
+            </a:lnRef>
+            <a:fillRef idx="1">
+              <a:schemeClr val="accent1"/>
+            </a:fillRef>
+            <a:effectRef idx="0">
+              <a:schemeClr val="accent1"/>
+            </a:effectRef>
+            <a:fontRef idx="minor">
+              <a:schemeClr val="lt1"/>
+            </a:fontRef>
+          </p:style>
+          <p:txBody>
+            <a:bodyPr rtlCol="0" anchor="ctr"/>
+            <a:lstStyle/>
+            <a:p>
+              <a:pPr algn="ctr"/>
+              <a:r>
+                <a:rPr lang="en-US" dirty="0"/>
+                <a:t>2</a:t>
+              </a:r>
+            </a:p>
+          </p:txBody>
+        </p:sp>
+        <p:sp>
+          <p:nvSpPr>
+            <p:cNvPr id="9" name="Ellipse 8"/>
+            <p:cNvSpPr/>
+            <p:nvPr/>
+          </p:nvSpPr>
+          <p:spPr>
+            <a:xfrm>
+              <a:off x="2088119" y="4258730"/>
+              <a:ext cx="328474" cy="328474"/>
+            </a:xfrm>
+            <a:prstGeom prst="ellipse">
+              <a:avLst/>
+            </a:prstGeom>
+            <a:solidFill>
+              <a:schemeClr val="tx1"/>
+            </a:solidFill>
+            <a:ln>
+              <a:solidFill>
+                <a:schemeClr val="tx1"/>
+              </a:solidFill>
+            </a:ln>
+          </p:spPr>
+          <p:style>
+            <a:lnRef idx="2">
+              <a:schemeClr val="accent1">
+                <a:shade val="50000"/>
+              </a:schemeClr>
+            </a:lnRef>
+            <a:fillRef idx="1">
+              <a:schemeClr val="accent1"/>
+            </a:fillRef>
+            <a:effectRef idx="0">
+              <a:schemeClr val="accent1"/>
+            </a:effectRef>
+            <a:fontRef idx="minor">
+              <a:schemeClr val="lt1"/>
+            </a:fontRef>
+          </p:style>
+          <p:txBody>
+            <a:bodyPr rtlCol="0" anchor="ctr"/>
+            <a:lstStyle/>
+            <a:p>
+              <a:pPr algn="ctr"/>
+              <a:r>
+                <a:rPr lang="en-US" dirty="0" smtClean="0"/>
+                <a:t>3</a:t>
+              </a:r>
+              <a:endParaRPr lang="en-US" dirty="0"/>
+            </a:p>
+          </p:txBody>
+        </p:sp>
+        <p:sp>
+          <p:nvSpPr>
+            <p:cNvPr id="10" name="Ellipse 9"/>
+            <p:cNvSpPr/>
+            <p:nvPr/>
+          </p:nvSpPr>
+          <p:spPr>
+            <a:xfrm>
+              <a:off x="1498839" y="5009190"/>
+              <a:ext cx="328474" cy="328474"/>
+            </a:xfrm>
+            <a:prstGeom prst="ellipse">
+              <a:avLst/>
+            </a:prstGeom>
+            <a:solidFill>
+              <a:schemeClr val="tx1"/>
+            </a:solidFill>
+            <a:ln>
+              <a:solidFill>
+                <a:schemeClr val="tx1"/>
+              </a:solidFill>
+            </a:ln>
+          </p:spPr>
+          <p:style>
+            <a:lnRef idx="2">
+              <a:schemeClr val="accent1">
+                <a:shade val="50000"/>
+              </a:schemeClr>
+            </a:lnRef>
+            <a:fillRef idx="1">
+              <a:schemeClr val="accent1"/>
+            </a:fillRef>
+            <a:effectRef idx="0">
+              <a:schemeClr val="accent1"/>
+            </a:effectRef>
+            <a:fontRef idx="minor">
+              <a:schemeClr val="lt1"/>
+            </a:fontRef>
+          </p:style>
+          <p:txBody>
+            <a:bodyPr rtlCol="0" anchor="ctr"/>
+            <a:lstStyle/>
+            <a:p>
+              <a:pPr algn="ctr"/>
+              <a:r>
+                <a:rPr lang="en-US" dirty="0" smtClean="0"/>
+                <a:t>7</a:t>
+              </a:r>
+              <a:endParaRPr lang="en-US" dirty="0"/>
+            </a:p>
+          </p:txBody>
+        </p:sp>
+        <p:sp>
+          <p:nvSpPr>
+            <p:cNvPr id="11" name="Ellipse 10"/>
+            <p:cNvSpPr/>
+            <p:nvPr/>
+          </p:nvSpPr>
+          <p:spPr>
+            <a:xfrm>
+              <a:off x="2893194" y="3403530"/>
+              <a:ext cx="328474" cy="328474"/>
+            </a:xfrm>
+            <a:prstGeom prst="ellipse">
+              <a:avLst/>
+            </a:prstGeom>
+            <a:solidFill>
+              <a:schemeClr val="tx1"/>
+            </a:solidFill>
+            <a:ln>
+              <a:solidFill>
+                <a:schemeClr val="tx1"/>
+              </a:solidFill>
+            </a:ln>
+          </p:spPr>
+          <p:style>
+            <a:lnRef idx="2">
+              <a:schemeClr val="accent1">
+                <a:shade val="50000"/>
+              </a:schemeClr>
+            </a:lnRef>
+            <a:fillRef idx="1">
+              <a:schemeClr val="accent1"/>
+            </a:fillRef>
+            <a:effectRef idx="0">
+              <a:schemeClr val="accent1"/>
+            </a:effectRef>
+            <a:fontRef idx="minor">
+              <a:schemeClr val="lt1"/>
+            </a:fontRef>
+          </p:style>
+          <p:txBody>
+            <a:bodyPr rtlCol="0" anchor="ctr"/>
+            <a:lstStyle/>
+            <a:p>
+              <a:pPr algn="ctr"/>
+              <a:r>
+                <a:rPr lang="en-US" dirty="0"/>
+                <a:t>4</a:t>
+              </a:r>
+            </a:p>
+          </p:txBody>
+        </p:sp>
+        <p:sp>
+          <p:nvSpPr>
+            <p:cNvPr id="12" name="Ellipse 11"/>
+            <p:cNvSpPr/>
+            <p:nvPr/>
+          </p:nvSpPr>
+          <p:spPr>
+            <a:xfrm>
+              <a:off x="3646105" y="1873782"/>
+              <a:ext cx="328474" cy="328474"/>
+            </a:xfrm>
+            <a:prstGeom prst="ellipse">
+              <a:avLst/>
+            </a:prstGeom>
+            <a:solidFill>
+              <a:schemeClr val="tx1"/>
+            </a:solidFill>
+            <a:ln>
+              <a:solidFill>
+                <a:schemeClr val="tx1"/>
+              </a:solidFill>
+            </a:ln>
+          </p:spPr>
+          <p:style>
+            <a:lnRef idx="2">
+              <a:schemeClr val="accent1">
+                <a:shade val="50000"/>
+              </a:schemeClr>
+            </a:lnRef>
+            <a:fillRef idx="1">
+              <a:schemeClr val="accent1"/>
+            </a:fillRef>
+            <a:effectRef idx="0">
+              <a:schemeClr val="accent1"/>
+            </a:effectRef>
+            <a:fontRef idx="minor">
+              <a:schemeClr val="lt1"/>
+            </a:fontRef>
+          </p:style>
+          <p:txBody>
+            <a:bodyPr rtlCol="0" anchor="ctr"/>
+            <a:lstStyle/>
+            <a:p>
+              <a:pPr algn="ctr"/>
+              <a:r>
+                <a:rPr lang="en-US" dirty="0" smtClean="0"/>
+                <a:t>5</a:t>
+              </a:r>
+              <a:endParaRPr lang="en-US" dirty="0"/>
+            </a:p>
+          </p:txBody>
+        </p:sp>
+        <p:sp>
+          <p:nvSpPr>
+            <p:cNvPr id="13" name="Ellipse 12"/>
+            <p:cNvSpPr/>
+            <p:nvPr/>
+          </p:nvSpPr>
+          <p:spPr>
+            <a:xfrm>
+              <a:off x="2280087" y="559293"/>
+              <a:ext cx="328474" cy="328474"/>
+            </a:xfrm>
+            <a:prstGeom prst="ellipse">
+              <a:avLst/>
+            </a:prstGeom>
+            <a:solidFill>
+              <a:schemeClr val="tx1"/>
+            </a:solidFill>
+            <a:ln>
+              <a:solidFill>
+                <a:schemeClr val="tx1"/>
+              </a:solidFill>
+            </a:ln>
+          </p:spPr>
+          <p:style>
+            <a:lnRef idx="2">
+              <a:schemeClr val="accent1">
+                <a:shade val="50000"/>
+              </a:schemeClr>
+            </a:lnRef>
+            <a:fillRef idx="1">
+              <a:schemeClr val="accent1"/>
+            </a:fillRef>
+            <a:effectRef idx="0">
+              <a:schemeClr val="accent1"/>
+            </a:effectRef>
+            <a:fontRef idx="minor">
+              <a:schemeClr val="lt1"/>
+            </a:fontRef>
+          </p:style>
+          <p:txBody>
+            <a:bodyPr rtlCol="0" anchor="ctr"/>
+            <a:lstStyle/>
+            <a:p>
+              <a:pPr algn="ctr"/>
+              <a:r>
+                <a:rPr lang="en-US" dirty="0" smtClean="0"/>
+                <a:t>6</a:t>
+              </a:r>
+              <a:endParaRPr lang="en-US" dirty="0"/>
+            </a:p>
+          </p:txBody>
+        </p:sp>
+        <p:sp>
+          <p:nvSpPr>
+            <p:cNvPr id="45" name="Ellipse 44"/>
+            <p:cNvSpPr/>
+            <p:nvPr/>
+          </p:nvSpPr>
+          <p:spPr>
+            <a:xfrm>
+              <a:off x="2140128" y="5948644"/>
+              <a:ext cx="328474" cy="328474"/>
+            </a:xfrm>
+            <a:prstGeom prst="ellipse">
+              <a:avLst/>
+            </a:prstGeom>
+            <a:solidFill>
+              <a:schemeClr val="tx1"/>
+            </a:solidFill>
+            <a:ln>
+              <a:solidFill>
+                <a:schemeClr val="tx1"/>
+              </a:solidFill>
+            </a:ln>
+          </p:spPr>
+          <p:style>
+            <a:lnRef idx="2">
+              <a:schemeClr val="accent1">
+                <a:shade val="50000"/>
+              </a:schemeClr>
+            </a:lnRef>
+            <a:fillRef idx="1">
+              <a:schemeClr val="accent1"/>
+            </a:fillRef>
+            <a:effectRef idx="0">
+              <a:schemeClr val="accent1"/>
+            </a:effectRef>
+            <a:fontRef idx="minor">
+              <a:schemeClr val="lt1"/>
+            </a:fontRef>
+          </p:style>
+          <p:txBody>
+            <a:bodyPr rtlCol="0" anchor="ctr"/>
+            <a:lstStyle/>
+            <a:p>
+              <a:pPr algn="ctr"/>
+              <a:r>
+                <a:rPr lang="en-US" dirty="0" smtClean="0"/>
+                <a:t>8</a:t>
+              </a:r>
+              <a:endParaRPr lang="en-US" dirty="0"/>
+            </a:p>
+          </p:txBody>
+        </p:sp>
+        <p:sp>
+          <p:nvSpPr>
+            <p:cNvPr id="46" name="Ellipse 45"/>
+            <p:cNvSpPr/>
+            <p:nvPr/>
+          </p:nvSpPr>
+          <p:spPr>
+            <a:xfrm>
+              <a:off x="3306809" y="5620170"/>
+              <a:ext cx="328474" cy="328474"/>
+            </a:xfrm>
+            <a:prstGeom prst="ellipse">
+              <a:avLst/>
+            </a:prstGeom>
+            <a:solidFill>
+              <a:schemeClr val="tx1"/>
+            </a:solidFill>
+            <a:ln>
+              <a:solidFill>
+                <a:schemeClr val="tx1"/>
+              </a:solidFill>
+            </a:ln>
+          </p:spPr>
+          <p:style>
+            <a:lnRef idx="2">
+              <a:schemeClr val="accent1">
+                <a:shade val="50000"/>
+              </a:schemeClr>
+            </a:lnRef>
+            <a:fillRef idx="1">
+              <a:schemeClr val="accent1"/>
+            </a:fillRef>
+            <a:effectRef idx="0">
+              <a:schemeClr val="accent1"/>
+            </a:effectRef>
+            <a:fontRef idx="minor">
+              <a:schemeClr val="lt1"/>
+            </a:fontRef>
+          </p:style>
+          <p:txBody>
+            <a:bodyPr rtlCol="0" anchor="ctr"/>
+            <a:lstStyle/>
+            <a:p>
+              <a:pPr algn="ctr"/>
+              <a:r>
+                <a:rPr lang="en-US" dirty="0" smtClean="0"/>
+                <a:t>9</a:t>
+              </a:r>
+              <a:endParaRPr lang="en-US" dirty="0"/>
+            </a:p>
+          </p:txBody>
+        </p:sp>
+        <p:sp>
+          <p:nvSpPr>
+            <p:cNvPr id="58" name="Ellipse 57"/>
+            <p:cNvSpPr/>
+            <p:nvPr/>
+          </p:nvSpPr>
+          <p:spPr>
+            <a:xfrm>
+              <a:off x="3510519" y="4491392"/>
+              <a:ext cx="328474" cy="328474"/>
+            </a:xfrm>
+            <a:prstGeom prst="ellipse">
+              <a:avLst/>
+            </a:prstGeom>
+            <a:solidFill>
+              <a:schemeClr val="tx1"/>
+            </a:solidFill>
+            <a:ln>
+              <a:solidFill>
+                <a:schemeClr val="tx1"/>
+              </a:solidFill>
+            </a:ln>
+          </p:spPr>
+          <p:style>
+            <a:lnRef idx="2">
+              <a:schemeClr val="accent1">
+                <a:shade val="50000"/>
+              </a:schemeClr>
+            </a:lnRef>
+            <a:fillRef idx="1">
+              <a:schemeClr val="accent1"/>
+            </a:fillRef>
+            <a:effectRef idx="0">
+              <a:schemeClr val="accent1"/>
+            </a:effectRef>
+            <a:fontRef idx="minor">
+              <a:schemeClr val="lt1"/>
+            </a:fontRef>
+          </p:style>
+          <p:txBody>
+            <a:bodyPr wrap="none" rtlCol="0" anchor="ctr"/>
+            <a:lstStyle/>
+            <a:p>
+              <a:pPr algn="ctr"/>
+              <a:r>
+                <a:rPr lang="en-US" dirty="0" smtClean="0"/>
+                <a:t>10</a:t>
+              </a:r>
+              <a:endParaRPr lang="en-US" dirty="0"/>
+            </a:p>
+          </p:txBody>
+        </p:sp>
+        <p:sp>
+          <p:nvSpPr>
+            <p:cNvPr id="59" name="Ellipse 58"/>
+            <p:cNvSpPr/>
+            <p:nvPr/>
+          </p:nvSpPr>
+          <p:spPr>
+            <a:xfrm>
+              <a:off x="4598370" y="3732004"/>
+              <a:ext cx="328474" cy="328474"/>
+            </a:xfrm>
+            <a:prstGeom prst="ellipse">
+              <a:avLst/>
+            </a:prstGeom>
+            <a:solidFill>
+              <a:schemeClr val="tx1"/>
+            </a:solidFill>
+            <a:ln>
+              <a:solidFill>
+                <a:schemeClr val="tx1"/>
+              </a:solidFill>
+            </a:ln>
+          </p:spPr>
+          <p:style>
+            <a:lnRef idx="2">
+              <a:schemeClr val="accent1">
+                <a:shade val="50000"/>
+              </a:schemeClr>
+            </a:lnRef>
+            <a:fillRef idx="1">
+              <a:schemeClr val="accent1"/>
+            </a:fillRef>
+            <a:effectRef idx="0">
+              <a:schemeClr val="accent1"/>
+            </a:effectRef>
+            <a:fontRef idx="minor">
+              <a:schemeClr val="lt1"/>
+            </a:fontRef>
+          </p:style>
+          <p:txBody>
+            <a:bodyPr wrap="none" rtlCol="0" anchor="ctr"/>
+            <a:lstStyle/>
+            <a:p>
+              <a:pPr algn="ctr"/>
+              <a:r>
+                <a:rPr lang="en-US" dirty="0" smtClean="0"/>
+                <a:t>11</a:t>
+              </a:r>
+              <a:endParaRPr lang="en-US" dirty="0"/>
+            </a:p>
+          </p:txBody>
+        </p:sp>
+      </p:grpSp>
+      <p:grpSp>
+        <p:nvGrpSpPr>
+          <p:cNvPr id="151" name="Kantenlabels"/>
+          <p:cNvGrpSpPr/>
           <p:nvPr/>
-        </p:nvSpPr>
-        <p:spPr>
+        </p:nvGrpSpPr>
+        <p:grpSpPr>
           <a:xfrm>
-            <a:off x="10150136" y="2192173"/>
-            <a:ext cx="328474" cy="328474"/>
+            <a:off x="5285482" y="1285396"/>
+            <a:ext cx="3594516" cy="5141999"/>
+            <a:chOff x="957322" y="1234043"/>
+            <a:chExt cx="3594516" cy="5141999"/>
           </a:xfrm>
-          <a:prstGeom prst="ellipse">
-            <a:avLst/>
-          </a:prstGeom>
-          <a:solidFill>
-            <a:schemeClr val="tx1"/>
-          </a:solidFill>
-        </p:spPr>
-        <p:style>
-          <a:lnRef idx="2">
-            <a:schemeClr val="accent1">
-              <a:shade val="50000"/>
-            </a:schemeClr>
-          </a:lnRef>
-          <a:fillRef idx="1">
-            <a:schemeClr val="accent1"/>
-          </a:fillRef>
-          <a:effectRef idx="0">
-            <a:schemeClr val="accent1"/>
-          </a:effectRef>
-          <a:fontRef idx="minor">
-            <a:schemeClr val="lt1"/>
-          </a:fontRef>
-        </p:style>
-        <p:txBody>
-          <a:bodyPr rtlCol="0" anchor="ctr"/>
-          <a:lstStyle/>
-          <a:p>
-            <a:pPr algn="ctr"/>
-            <a:r>
-              <a:rPr lang="en-US" dirty="0" smtClean="0"/>
-              <a:t>3</a:t>
-            </a:r>
-            <a:endParaRPr lang="en-US" dirty="0"/>
-          </a:p>
-        </p:txBody>
-      </p:sp>
-      <p:cxnSp>
-        <p:nvCxnSpPr>
-          <p:cNvPr id="7" name="Gerader Verbinder 6"/>
-          <p:cNvCxnSpPr>
-            <a:stCxn id="4" idx="7"/>
-            <a:endCxn id="5" idx="3"/>
-          </p:cNvCxnSpPr>
-          <p:nvPr/>
-        </p:nvCxnSpPr>
-        <p:spPr>
-          <a:xfrm flipV="1">
-            <a:off x="7582295" y="1125934"/>
-            <a:ext cx="697628" cy="1066239"/>
-          </a:xfrm>
-          <a:prstGeom prst="line">
-            <a:avLst/>
-          </a:prstGeom>
-          <a:ln w="38100">
-            <a:solidFill>
-              <a:schemeClr val="tx1"/>
-            </a:solidFill>
-          </a:ln>
-        </p:spPr>
-        <p:style>
-          <a:lnRef idx="1">
-            <a:schemeClr val="accent1"/>
-          </a:lnRef>
-          <a:fillRef idx="0">
-            <a:schemeClr val="accent1"/>
-          </a:fillRef>
-          <a:effectRef idx="0">
-            <a:schemeClr val="accent1"/>
-          </a:effectRef>
-          <a:fontRef idx="minor">
-            <a:schemeClr val="tx1"/>
-          </a:fontRef>
-        </p:style>
-      </p:cxnSp>
-      <p:cxnSp>
-        <p:nvCxnSpPr>
-          <p:cNvPr id="8" name="Gerader Verbinder 7"/>
-          <p:cNvCxnSpPr>
-            <a:stCxn id="6" idx="1"/>
-            <a:endCxn id="5" idx="5"/>
-          </p:cNvCxnSpPr>
-          <p:nvPr/>
-        </p:nvCxnSpPr>
-        <p:spPr>
-          <a:xfrm flipH="1" flipV="1">
-            <a:off x="8512189" y="1125934"/>
-            <a:ext cx="1686051" cy="1114343"/>
-          </a:xfrm>
-          <a:prstGeom prst="line">
-            <a:avLst/>
-          </a:prstGeom>
-          <a:ln w="38100">
-            <a:solidFill>
-              <a:schemeClr val="tx1"/>
-            </a:solidFill>
-          </a:ln>
-        </p:spPr>
-        <p:style>
-          <a:lnRef idx="1">
-            <a:schemeClr val="accent1"/>
-          </a:lnRef>
-          <a:fillRef idx="0">
-            <a:schemeClr val="accent1"/>
-          </a:fillRef>
-          <a:effectRef idx="0">
-            <a:schemeClr val="accent1"/>
-          </a:effectRef>
-          <a:fontRef idx="minor">
-            <a:schemeClr val="tx1"/>
-          </a:fontRef>
-        </p:style>
-      </p:cxnSp>
-      <p:cxnSp>
-        <p:nvCxnSpPr>
-          <p:cNvPr id="9" name="Gerader Verbinder 8"/>
-          <p:cNvCxnSpPr>
-            <a:stCxn id="6" idx="2"/>
-            <a:endCxn id="4" idx="6"/>
-          </p:cNvCxnSpPr>
-          <p:nvPr/>
-        </p:nvCxnSpPr>
-        <p:spPr>
-          <a:xfrm flipH="1" flipV="1">
-            <a:off x="7630399" y="2308306"/>
-            <a:ext cx="2519737" cy="48104"/>
-          </a:xfrm>
-          <a:prstGeom prst="line">
-            <a:avLst/>
-          </a:prstGeom>
-          <a:ln w="38100">
-            <a:solidFill>
-              <a:schemeClr val="tx1"/>
-            </a:solidFill>
-          </a:ln>
-        </p:spPr>
-        <p:style>
-          <a:lnRef idx="1">
-            <a:schemeClr val="accent1"/>
-          </a:lnRef>
-          <a:fillRef idx="0">
-            <a:schemeClr val="accent1"/>
-          </a:fillRef>
-          <a:effectRef idx="0">
-            <a:schemeClr val="accent1"/>
-          </a:effectRef>
-          <a:fontRef idx="minor">
-            <a:schemeClr val="tx1"/>
-          </a:fontRef>
-        </p:style>
-      </p:cxnSp>
-      <p:sp>
-        <p:nvSpPr>
-          <p:cNvPr id="10" name="Textfeld 9"/>
-          <p:cNvSpPr txBox="1"/>
-          <p:nvPr/>
-        </p:nvSpPr>
-        <p:spPr>
-          <a:xfrm>
-            <a:off x="7543860" y="1390910"/>
-            <a:ext cx="301686" cy="369332"/>
-          </a:xfrm>
-          <a:prstGeom prst="rect">
-            <a:avLst/>
-          </a:prstGeom>
-          <a:noFill/>
-        </p:spPr>
-        <p:txBody>
-          <a:bodyPr wrap="none" rtlCol="0">
-            <a:spAutoFit/>
-          </a:bodyPr>
-          <a:lstStyle/>
-          <a:p>
-            <a:r>
-              <a:rPr lang="en-US" dirty="0" smtClean="0"/>
-              <a:t>5</a:t>
-            </a:r>
-            <a:endParaRPr lang="en-US" dirty="0"/>
-          </a:p>
-        </p:txBody>
-      </p:sp>
-      <p:sp>
-        <p:nvSpPr>
-          <p:cNvPr id="11" name="Textfeld 10"/>
-          <p:cNvSpPr txBox="1"/>
-          <p:nvPr/>
-        </p:nvSpPr>
-        <p:spPr>
-          <a:xfrm>
-            <a:off x="9355214" y="1342806"/>
-            <a:ext cx="418704" cy="369332"/>
-          </a:xfrm>
-          <a:prstGeom prst="rect">
-            <a:avLst/>
-          </a:prstGeom>
-          <a:noFill/>
-        </p:spPr>
-        <p:txBody>
-          <a:bodyPr wrap="none" rtlCol="0">
-            <a:spAutoFit/>
-          </a:bodyPr>
-          <a:lstStyle/>
-          <a:p>
-            <a:r>
-              <a:rPr lang="en-US" dirty="0"/>
-              <a:t>1</a:t>
-            </a:r>
-            <a:r>
-              <a:rPr lang="en-US" dirty="0" smtClean="0"/>
-              <a:t>5</a:t>
-            </a:r>
-            <a:endParaRPr lang="en-US" dirty="0"/>
-          </a:p>
-        </p:txBody>
-      </p:sp>
-      <p:sp>
-        <p:nvSpPr>
-          <p:cNvPr id="12" name="Textfeld 11"/>
-          <p:cNvSpPr txBox="1"/>
-          <p:nvPr/>
-        </p:nvSpPr>
-        <p:spPr>
-          <a:xfrm>
-            <a:off x="8681033" y="2335981"/>
-            <a:ext cx="418704" cy="369332"/>
-          </a:xfrm>
-          <a:prstGeom prst="rect">
-            <a:avLst/>
-          </a:prstGeom>
-          <a:noFill/>
-        </p:spPr>
-        <p:txBody>
-          <a:bodyPr wrap="none" rtlCol="0">
-            <a:spAutoFit/>
-          </a:bodyPr>
-          <a:lstStyle/>
-          <a:p>
-            <a:r>
-              <a:rPr lang="en-US" dirty="0" smtClean="0"/>
-              <a:t>10</a:t>
-            </a:r>
-            <a:endParaRPr lang="en-US" dirty="0"/>
-          </a:p>
-        </p:txBody>
-      </p:sp>
-      <p:sp>
-        <p:nvSpPr>
-          <p:cNvPr id="13" name="Textfeld 12"/>
-          <p:cNvSpPr txBox="1"/>
-          <p:nvPr/>
-        </p:nvSpPr>
-        <p:spPr>
-          <a:xfrm>
-            <a:off x="6956441" y="2469261"/>
-            <a:ext cx="699230" cy="369332"/>
-          </a:xfrm>
-          <a:prstGeom prst="rect">
-            <a:avLst/>
-          </a:prstGeom>
-          <a:noFill/>
-        </p:spPr>
-        <p:txBody>
-          <a:bodyPr wrap="none" rtlCol="0">
-            <a:spAutoFit/>
-          </a:bodyPr>
-          <a:lstStyle/>
-          <a:p>
-            <a:r>
-              <a:rPr lang="en-US" dirty="0" smtClean="0"/>
-              <a:t>w=10</a:t>
-            </a:r>
-            <a:endParaRPr lang="en-US" dirty="0"/>
-          </a:p>
-        </p:txBody>
-      </p:sp>
-      <p:sp>
-        <p:nvSpPr>
-          <p:cNvPr id="14" name="Textfeld 13"/>
-          <p:cNvSpPr txBox="1"/>
-          <p:nvPr/>
-        </p:nvSpPr>
-        <p:spPr>
-          <a:xfrm>
-            <a:off x="8046441" y="439783"/>
-            <a:ext cx="699230" cy="369332"/>
-          </a:xfrm>
-          <a:prstGeom prst="rect">
-            <a:avLst/>
-          </a:prstGeom>
-          <a:noFill/>
-        </p:spPr>
-        <p:txBody>
-          <a:bodyPr wrap="none" rtlCol="0">
-            <a:spAutoFit/>
-          </a:bodyPr>
-          <a:lstStyle/>
-          <a:p>
-            <a:r>
-              <a:rPr lang="en-US" dirty="0" smtClean="0"/>
-              <a:t>w=30</a:t>
-            </a:r>
-            <a:endParaRPr lang="en-US" dirty="0"/>
-          </a:p>
-        </p:txBody>
-      </p:sp>
-      <p:sp>
-        <p:nvSpPr>
-          <p:cNvPr id="15" name="Textfeld 14"/>
-          <p:cNvSpPr txBox="1"/>
-          <p:nvPr/>
-        </p:nvSpPr>
-        <p:spPr>
-          <a:xfrm>
-            <a:off x="10386454" y="2240277"/>
-            <a:ext cx="699230" cy="369332"/>
-          </a:xfrm>
-          <a:prstGeom prst="rect">
-            <a:avLst/>
-          </a:prstGeom>
-          <a:noFill/>
-        </p:spPr>
-        <p:txBody>
-          <a:bodyPr wrap="none" rtlCol="0">
-            <a:spAutoFit/>
-          </a:bodyPr>
-          <a:lstStyle/>
-          <a:p>
-            <a:r>
-              <a:rPr lang="en-US" dirty="0" smtClean="0"/>
-              <a:t>w=60</a:t>
-            </a:r>
-            <a:endParaRPr lang="en-US" dirty="0"/>
-          </a:p>
-        </p:txBody>
-      </p:sp>
-      <p:sp>
-        <p:nvSpPr>
-          <p:cNvPr id="16" name="Textfeld 15"/>
-          <p:cNvSpPr txBox="1"/>
-          <p:nvPr/>
-        </p:nvSpPr>
-        <p:spPr>
-          <a:xfrm>
-            <a:off x="6469508" y="952603"/>
-            <a:ext cx="1093569" cy="646331"/>
-          </a:xfrm>
-          <a:prstGeom prst="rect">
-            <a:avLst/>
-          </a:prstGeom>
-          <a:noFill/>
-        </p:spPr>
-        <p:txBody>
-          <a:bodyPr wrap="none" rtlCol="0">
-            <a:spAutoFit/>
-          </a:bodyPr>
-          <a:lstStyle/>
-          <a:p>
-            <a:r>
-              <a:rPr lang="en-US" dirty="0"/>
-              <a:t>r(e12) = 2</a:t>
-            </a:r>
-            <a:endParaRPr lang="en-US" dirty="0" smtClean="0"/>
-          </a:p>
-          <a:p>
-            <a:pPr marL="0" lvl="1"/>
-            <a:r>
-              <a:rPr lang="en-US" dirty="0"/>
-              <a:t>r(e21) = </a:t>
-            </a:r>
-            <a:r>
-              <a:rPr lang="en-US" dirty="0" smtClean="0"/>
-              <a:t>6</a:t>
-            </a:r>
-            <a:endParaRPr lang="en-US" dirty="0"/>
-          </a:p>
-        </p:txBody>
-      </p:sp>
-      <p:sp>
-        <p:nvSpPr>
-          <p:cNvPr id="17" name="Textfeld 16"/>
-          <p:cNvSpPr txBox="1"/>
-          <p:nvPr/>
-        </p:nvSpPr>
-        <p:spPr>
-          <a:xfrm>
-            <a:off x="8343482" y="2653927"/>
-            <a:ext cx="1093569" cy="646331"/>
-          </a:xfrm>
-          <a:prstGeom prst="rect">
-            <a:avLst/>
-          </a:prstGeom>
-          <a:noFill/>
-        </p:spPr>
-        <p:txBody>
-          <a:bodyPr wrap="none" rtlCol="0">
-            <a:spAutoFit/>
-          </a:bodyPr>
-          <a:lstStyle/>
-          <a:p>
-            <a:r>
-              <a:rPr lang="en-US" dirty="0"/>
-              <a:t>r(e13) = </a:t>
-            </a:r>
-            <a:r>
-              <a:rPr lang="en-US" dirty="0" smtClean="0"/>
-              <a:t>1</a:t>
-            </a:r>
-          </a:p>
-          <a:p>
-            <a:pPr marL="0" lvl="1"/>
-            <a:r>
-              <a:rPr lang="en-US" dirty="0"/>
-              <a:t>r(e31) = </a:t>
-            </a:r>
-            <a:r>
-              <a:rPr lang="en-US" dirty="0" smtClean="0"/>
-              <a:t>6</a:t>
-            </a:r>
-            <a:endParaRPr lang="en-US" dirty="0"/>
-          </a:p>
-        </p:txBody>
-      </p:sp>
-      <p:sp>
-        <p:nvSpPr>
-          <p:cNvPr id="18" name="Textfeld 17"/>
-          <p:cNvSpPr txBox="1"/>
-          <p:nvPr/>
-        </p:nvSpPr>
-        <p:spPr>
-          <a:xfrm>
-            <a:off x="9829580" y="974463"/>
-            <a:ext cx="1093569" cy="646331"/>
-          </a:xfrm>
-          <a:prstGeom prst="rect">
-            <a:avLst/>
-          </a:prstGeom>
-          <a:noFill/>
-        </p:spPr>
-        <p:txBody>
-          <a:bodyPr wrap="none" rtlCol="0">
-            <a:spAutoFit/>
-          </a:bodyPr>
-          <a:lstStyle/>
-          <a:p>
-            <a:r>
-              <a:rPr lang="en-US" dirty="0"/>
-              <a:t>r(e23) = </a:t>
-            </a:r>
-            <a:r>
-              <a:rPr lang="en-US" dirty="0" smtClean="0"/>
-              <a:t>2</a:t>
-            </a:r>
-          </a:p>
-          <a:p>
-            <a:pPr marL="0" lvl="1"/>
-            <a:r>
-              <a:rPr lang="en-US" dirty="0"/>
-              <a:t>r(e32) = </a:t>
-            </a:r>
-            <a:r>
-              <a:rPr lang="en-US" dirty="0" smtClean="0"/>
-              <a:t>4</a:t>
-            </a:r>
-            <a:endParaRPr lang="en-US" dirty="0"/>
-          </a:p>
-        </p:txBody>
-      </p:sp>
+        </p:grpSpPr>
+        <p:sp>
+          <p:nvSpPr>
+            <p:cNvPr id="74" name="Textfeld 73"/>
+            <p:cNvSpPr txBox="1"/>
+            <p:nvPr/>
+          </p:nvSpPr>
+          <p:spPr>
+            <a:xfrm>
+              <a:off x="1883083" y="3761496"/>
+              <a:ext cx="418704" cy="369332"/>
+            </a:xfrm>
+            <a:prstGeom prst="rect">
+              <a:avLst/>
+            </a:prstGeom>
+            <a:noFill/>
+          </p:spPr>
+          <p:txBody>
+            <a:bodyPr wrap="none" rtlCol="0">
+              <a:spAutoFit/>
+            </a:bodyPr>
+            <a:lstStyle/>
+            <a:p>
+              <a:r>
+                <a:rPr lang="en-US" dirty="0" smtClean="0"/>
+                <a:t>10</a:t>
+              </a:r>
+              <a:endParaRPr lang="en-US" dirty="0"/>
+            </a:p>
+          </p:txBody>
+        </p:sp>
+        <p:sp>
+          <p:nvSpPr>
+            <p:cNvPr id="75" name="Textfeld 74"/>
+            <p:cNvSpPr txBox="1"/>
+            <p:nvPr/>
+          </p:nvSpPr>
+          <p:spPr>
+            <a:xfrm>
+              <a:off x="2203902" y="3377296"/>
+              <a:ext cx="418704" cy="369332"/>
+            </a:xfrm>
+            <a:prstGeom prst="rect">
+              <a:avLst/>
+            </a:prstGeom>
+            <a:noFill/>
+          </p:spPr>
+          <p:txBody>
+            <a:bodyPr wrap="none" rtlCol="0">
+              <a:spAutoFit/>
+            </a:bodyPr>
+            <a:lstStyle/>
+            <a:p>
+              <a:r>
+                <a:rPr lang="en-US" dirty="0" smtClean="0"/>
+                <a:t>20</a:t>
+              </a:r>
+              <a:endParaRPr lang="en-US" dirty="0"/>
+            </a:p>
+          </p:txBody>
+        </p:sp>
+        <p:sp>
+          <p:nvSpPr>
+            <p:cNvPr id="76" name="Textfeld 75"/>
+            <p:cNvSpPr txBox="1"/>
+            <p:nvPr/>
+          </p:nvSpPr>
+          <p:spPr>
+            <a:xfrm>
+              <a:off x="2658412" y="3882127"/>
+              <a:ext cx="418704" cy="369332"/>
+            </a:xfrm>
+            <a:prstGeom prst="rect">
+              <a:avLst/>
+            </a:prstGeom>
+            <a:noFill/>
+          </p:spPr>
+          <p:txBody>
+            <a:bodyPr wrap="none" rtlCol="0">
+              <a:spAutoFit/>
+            </a:bodyPr>
+            <a:lstStyle/>
+            <a:p>
+              <a:r>
+                <a:rPr lang="en-US" dirty="0" smtClean="0"/>
+                <a:t>10</a:t>
+              </a:r>
+              <a:endParaRPr lang="en-US" dirty="0"/>
+            </a:p>
+          </p:txBody>
+        </p:sp>
+        <p:sp>
+          <p:nvSpPr>
+            <p:cNvPr id="82" name="Textfeld 81"/>
+            <p:cNvSpPr txBox="1"/>
+            <p:nvPr/>
+          </p:nvSpPr>
+          <p:spPr>
+            <a:xfrm>
+              <a:off x="3322049" y="2786383"/>
+              <a:ext cx="418704" cy="369332"/>
+            </a:xfrm>
+            <a:prstGeom prst="rect">
+              <a:avLst/>
+            </a:prstGeom>
+            <a:noFill/>
+          </p:spPr>
+          <p:txBody>
+            <a:bodyPr wrap="none" rtlCol="0">
+              <a:spAutoFit/>
+            </a:bodyPr>
+            <a:lstStyle/>
+            <a:p>
+              <a:r>
+                <a:rPr lang="en-US" dirty="0" smtClean="0"/>
+                <a:t>30</a:t>
+              </a:r>
+              <a:endParaRPr lang="en-US" dirty="0"/>
+            </a:p>
+          </p:txBody>
+        </p:sp>
+        <p:sp>
+          <p:nvSpPr>
+            <p:cNvPr id="91" name="Textfeld 90"/>
+            <p:cNvSpPr txBox="1"/>
+            <p:nvPr/>
+          </p:nvSpPr>
+          <p:spPr>
+            <a:xfrm>
+              <a:off x="3295314" y="1234043"/>
+              <a:ext cx="418704" cy="369332"/>
+            </a:xfrm>
+            <a:prstGeom prst="rect">
+              <a:avLst/>
+            </a:prstGeom>
+            <a:noFill/>
+          </p:spPr>
+          <p:txBody>
+            <a:bodyPr wrap="none" rtlCol="0">
+              <a:spAutoFit/>
+            </a:bodyPr>
+            <a:lstStyle/>
+            <a:p>
+              <a:r>
+                <a:rPr lang="en-US" dirty="0" smtClean="0"/>
+                <a:t>30</a:t>
+              </a:r>
+              <a:endParaRPr lang="en-US" dirty="0"/>
+            </a:p>
+          </p:txBody>
+        </p:sp>
+        <p:sp>
+          <p:nvSpPr>
+            <p:cNvPr id="92" name="Textfeld 91"/>
+            <p:cNvSpPr txBox="1"/>
+            <p:nvPr/>
+          </p:nvSpPr>
+          <p:spPr>
+            <a:xfrm>
+              <a:off x="2575990" y="2280291"/>
+              <a:ext cx="418704" cy="369332"/>
+            </a:xfrm>
+            <a:prstGeom prst="rect">
+              <a:avLst/>
+            </a:prstGeom>
+            <a:noFill/>
+          </p:spPr>
+          <p:txBody>
+            <a:bodyPr wrap="none" rtlCol="0">
+              <a:spAutoFit/>
+            </a:bodyPr>
+            <a:lstStyle/>
+            <a:p>
+              <a:r>
+                <a:rPr lang="en-US" dirty="0" smtClean="0"/>
+                <a:t>40</a:t>
+              </a:r>
+              <a:endParaRPr lang="en-US" dirty="0"/>
+            </a:p>
+          </p:txBody>
+        </p:sp>
+        <p:sp>
+          <p:nvSpPr>
+            <p:cNvPr id="93" name="Textfeld 92"/>
+            <p:cNvSpPr txBox="1"/>
+            <p:nvPr/>
+          </p:nvSpPr>
+          <p:spPr>
+            <a:xfrm>
+              <a:off x="1569857" y="1971058"/>
+              <a:ext cx="418704" cy="369332"/>
+            </a:xfrm>
+            <a:prstGeom prst="rect">
+              <a:avLst/>
+            </a:prstGeom>
+            <a:noFill/>
+          </p:spPr>
+          <p:txBody>
+            <a:bodyPr wrap="none" rtlCol="0">
+              <a:spAutoFit/>
+            </a:bodyPr>
+            <a:lstStyle/>
+            <a:p>
+              <a:r>
+                <a:rPr lang="en-US" dirty="0"/>
+                <a:t>6</a:t>
+              </a:r>
+              <a:r>
+                <a:rPr lang="en-US" dirty="0" smtClean="0"/>
+                <a:t>0</a:t>
+              </a:r>
+              <a:endParaRPr lang="en-US" dirty="0"/>
+            </a:p>
+          </p:txBody>
+        </p:sp>
+        <p:sp>
+          <p:nvSpPr>
+            <p:cNvPr id="109" name="Textfeld 108"/>
+            <p:cNvSpPr txBox="1"/>
+            <p:nvPr/>
+          </p:nvSpPr>
+          <p:spPr>
+            <a:xfrm>
+              <a:off x="1405620" y="4096804"/>
+              <a:ext cx="418704" cy="369332"/>
+            </a:xfrm>
+            <a:prstGeom prst="rect">
+              <a:avLst/>
+            </a:prstGeom>
+            <a:noFill/>
+          </p:spPr>
+          <p:txBody>
+            <a:bodyPr wrap="none" rtlCol="0">
+              <a:spAutoFit/>
+            </a:bodyPr>
+            <a:lstStyle/>
+            <a:p>
+              <a:r>
+                <a:rPr lang="en-US" dirty="0" smtClean="0"/>
+                <a:t>20</a:t>
+              </a:r>
+              <a:endParaRPr lang="en-US" dirty="0"/>
+            </a:p>
+          </p:txBody>
+        </p:sp>
+        <p:sp>
+          <p:nvSpPr>
+            <p:cNvPr id="110" name="Textfeld 109"/>
+            <p:cNvSpPr txBox="1"/>
+            <p:nvPr/>
+          </p:nvSpPr>
+          <p:spPr>
+            <a:xfrm>
+              <a:off x="957322" y="4746676"/>
+              <a:ext cx="418704" cy="369332"/>
+            </a:xfrm>
+            <a:prstGeom prst="rect">
+              <a:avLst/>
+            </a:prstGeom>
+            <a:noFill/>
+          </p:spPr>
+          <p:txBody>
+            <a:bodyPr wrap="none" rtlCol="0">
+              <a:spAutoFit/>
+            </a:bodyPr>
+            <a:lstStyle/>
+            <a:p>
+              <a:r>
+                <a:rPr lang="en-US" dirty="0" smtClean="0"/>
+                <a:t>10</a:t>
+              </a:r>
+              <a:endParaRPr lang="en-US" dirty="0"/>
+            </a:p>
+          </p:txBody>
+        </p:sp>
+        <p:sp>
+          <p:nvSpPr>
+            <p:cNvPr id="111" name="Textfeld 110"/>
+            <p:cNvSpPr txBox="1"/>
+            <p:nvPr/>
+          </p:nvSpPr>
+          <p:spPr>
+            <a:xfrm>
+              <a:off x="1513809" y="4522457"/>
+              <a:ext cx="418704" cy="369332"/>
+            </a:xfrm>
+            <a:prstGeom prst="rect">
+              <a:avLst/>
+            </a:prstGeom>
+            <a:noFill/>
+          </p:spPr>
+          <p:txBody>
+            <a:bodyPr wrap="none" rtlCol="0">
+              <a:spAutoFit/>
+            </a:bodyPr>
+            <a:lstStyle/>
+            <a:p>
+              <a:r>
+                <a:rPr lang="en-US" smtClean="0"/>
+                <a:t>11</a:t>
+              </a:r>
+              <a:endParaRPr lang="en-US" dirty="0"/>
+            </a:p>
+          </p:txBody>
+        </p:sp>
+        <p:sp>
+          <p:nvSpPr>
+            <p:cNvPr id="112" name="Textfeld 111"/>
+            <p:cNvSpPr txBox="1"/>
+            <p:nvPr/>
+          </p:nvSpPr>
+          <p:spPr>
+            <a:xfrm>
+              <a:off x="1513809" y="5574984"/>
+              <a:ext cx="418704" cy="369332"/>
+            </a:xfrm>
+            <a:prstGeom prst="rect">
+              <a:avLst/>
+            </a:prstGeom>
+            <a:noFill/>
+          </p:spPr>
+          <p:txBody>
+            <a:bodyPr wrap="none" rtlCol="0">
+              <a:spAutoFit/>
+            </a:bodyPr>
+            <a:lstStyle/>
+            <a:p>
+              <a:r>
+                <a:rPr lang="en-US" dirty="0" smtClean="0"/>
+                <a:t>20</a:t>
+              </a:r>
+              <a:endParaRPr lang="en-US" dirty="0"/>
+            </a:p>
+          </p:txBody>
+        </p:sp>
+        <p:sp>
+          <p:nvSpPr>
+            <p:cNvPr id="113" name="Textfeld 112"/>
+            <p:cNvSpPr txBox="1"/>
+            <p:nvPr/>
+          </p:nvSpPr>
+          <p:spPr>
+            <a:xfrm>
+              <a:off x="2732681" y="6006710"/>
+              <a:ext cx="418704" cy="369332"/>
+            </a:xfrm>
+            <a:prstGeom prst="rect">
+              <a:avLst/>
+            </a:prstGeom>
+            <a:noFill/>
+          </p:spPr>
+          <p:txBody>
+            <a:bodyPr wrap="none" rtlCol="0">
+              <a:spAutoFit/>
+            </a:bodyPr>
+            <a:lstStyle/>
+            <a:p>
+              <a:r>
+                <a:rPr lang="en-US" dirty="0" smtClean="0"/>
+                <a:t>10</a:t>
+              </a:r>
+              <a:endParaRPr lang="en-US" dirty="0"/>
+            </a:p>
+          </p:txBody>
+        </p:sp>
+        <p:sp>
+          <p:nvSpPr>
+            <p:cNvPr id="114" name="Textfeld 113"/>
+            <p:cNvSpPr txBox="1"/>
+            <p:nvPr/>
+          </p:nvSpPr>
+          <p:spPr>
+            <a:xfrm>
+              <a:off x="2466043" y="5025621"/>
+              <a:ext cx="418704" cy="369332"/>
+            </a:xfrm>
+            <a:prstGeom prst="rect">
+              <a:avLst/>
+            </a:prstGeom>
+            <a:noFill/>
+          </p:spPr>
+          <p:txBody>
+            <a:bodyPr wrap="none" rtlCol="0">
+              <a:spAutoFit/>
+            </a:bodyPr>
+            <a:lstStyle/>
+            <a:p>
+              <a:r>
+                <a:rPr lang="en-US" dirty="0" smtClean="0"/>
+                <a:t>30</a:t>
+              </a:r>
+              <a:endParaRPr lang="en-US" dirty="0"/>
+            </a:p>
+          </p:txBody>
+        </p:sp>
+        <p:sp>
+          <p:nvSpPr>
+            <p:cNvPr id="115" name="Textfeld 114"/>
+            <p:cNvSpPr txBox="1"/>
+            <p:nvPr/>
+          </p:nvSpPr>
+          <p:spPr>
+            <a:xfrm>
+              <a:off x="2940779" y="4278016"/>
+              <a:ext cx="418704" cy="369332"/>
+            </a:xfrm>
+            <a:prstGeom prst="rect">
+              <a:avLst/>
+            </a:prstGeom>
+            <a:noFill/>
+          </p:spPr>
+          <p:txBody>
+            <a:bodyPr wrap="none" rtlCol="0">
+              <a:spAutoFit/>
+            </a:bodyPr>
+            <a:lstStyle/>
+            <a:p>
+              <a:r>
+                <a:rPr lang="en-US" dirty="0" smtClean="0"/>
+                <a:t>10</a:t>
+              </a:r>
+              <a:endParaRPr lang="en-US" dirty="0"/>
+            </a:p>
+          </p:txBody>
+        </p:sp>
+        <p:sp>
+          <p:nvSpPr>
+            <p:cNvPr id="116" name="Textfeld 115"/>
+            <p:cNvSpPr txBox="1"/>
+            <p:nvPr/>
+          </p:nvSpPr>
+          <p:spPr>
+            <a:xfrm>
+              <a:off x="3687957" y="4099236"/>
+              <a:ext cx="418704" cy="369332"/>
+            </a:xfrm>
+            <a:prstGeom prst="rect">
+              <a:avLst/>
+            </a:prstGeom>
+            <a:noFill/>
+          </p:spPr>
+          <p:txBody>
+            <a:bodyPr wrap="none" rtlCol="0">
+              <a:spAutoFit/>
+            </a:bodyPr>
+            <a:lstStyle/>
+            <a:p>
+              <a:r>
+                <a:rPr lang="en-US" dirty="0" smtClean="0"/>
+                <a:t>10</a:t>
+              </a:r>
+              <a:endParaRPr lang="en-US" dirty="0"/>
+            </a:p>
+          </p:txBody>
+        </p:sp>
+        <p:sp>
+          <p:nvSpPr>
+            <p:cNvPr id="117" name="Textfeld 116"/>
+            <p:cNvSpPr txBox="1"/>
+            <p:nvPr/>
+          </p:nvSpPr>
+          <p:spPr>
+            <a:xfrm>
+              <a:off x="3256052" y="4804095"/>
+              <a:ext cx="418704" cy="369332"/>
+            </a:xfrm>
+            <a:prstGeom prst="rect">
+              <a:avLst/>
+            </a:prstGeom>
+            <a:noFill/>
+          </p:spPr>
+          <p:txBody>
+            <a:bodyPr wrap="none" rtlCol="0">
+              <a:spAutoFit/>
+            </a:bodyPr>
+            <a:lstStyle/>
+            <a:p>
+              <a:r>
+                <a:rPr lang="en-US" dirty="0" smtClean="0"/>
+                <a:t>10</a:t>
+              </a:r>
+              <a:endParaRPr lang="en-US" dirty="0"/>
+            </a:p>
+          </p:txBody>
+        </p:sp>
+        <p:sp>
+          <p:nvSpPr>
+            <p:cNvPr id="118" name="Textfeld 117"/>
+            <p:cNvSpPr txBox="1"/>
+            <p:nvPr/>
+          </p:nvSpPr>
+          <p:spPr>
+            <a:xfrm>
+              <a:off x="4133134" y="4824769"/>
+              <a:ext cx="418704" cy="369332"/>
+            </a:xfrm>
+            <a:prstGeom prst="rect">
+              <a:avLst/>
+            </a:prstGeom>
+            <a:noFill/>
+          </p:spPr>
+          <p:txBody>
+            <a:bodyPr wrap="none" rtlCol="0">
+              <a:spAutoFit/>
+            </a:bodyPr>
+            <a:lstStyle/>
+            <a:p>
+              <a:r>
+                <a:rPr lang="en-US" dirty="0"/>
+                <a:t>4</a:t>
+              </a:r>
+              <a:r>
+                <a:rPr lang="en-US" dirty="0" smtClean="0"/>
+                <a:t>0</a:t>
+              </a:r>
+              <a:endParaRPr lang="en-US" dirty="0"/>
+            </a:p>
+          </p:txBody>
+        </p:sp>
+        <p:sp>
+          <p:nvSpPr>
+            <p:cNvPr id="119" name="Textfeld 118"/>
+            <p:cNvSpPr txBox="1"/>
+            <p:nvPr/>
+          </p:nvSpPr>
+          <p:spPr>
+            <a:xfrm>
+              <a:off x="3494922" y="3800600"/>
+              <a:ext cx="418704" cy="369332"/>
+            </a:xfrm>
+            <a:prstGeom prst="rect">
+              <a:avLst/>
+            </a:prstGeom>
+            <a:noFill/>
+          </p:spPr>
+          <p:txBody>
+            <a:bodyPr wrap="none" rtlCol="0">
+              <a:spAutoFit/>
+            </a:bodyPr>
+            <a:lstStyle/>
+            <a:p>
+              <a:r>
+                <a:rPr lang="en-US" dirty="0" smtClean="0"/>
+                <a:t>35</a:t>
+              </a:r>
+              <a:endParaRPr lang="en-US" dirty="0"/>
+            </a:p>
+          </p:txBody>
+        </p:sp>
+        <p:sp>
+          <p:nvSpPr>
+            <p:cNvPr id="153" name="Textfeld 152"/>
+            <p:cNvSpPr txBox="1"/>
+            <p:nvPr/>
+          </p:nvSpPr>
+          <p:spPr>
+            <a:xfrm>
+              <a:off x="969573" y="3812614"/>
+              <a:ext cx="418704" cy="369332"/>
+            </a:xfrm>
+            <a:prstGeom prst="rect">
+              <a:avLst/>
+            </a:prstGeom>
+            <a:noFill/>
+          </p:spPr>
+          <p:txBody>
+            <a:bodyPr wrap="none" rtlCol="0">
+              <a:spAutoFit/>
+            </a:bodyPr>
+            <a:lstStyle/>
+            <a:p>
+              <a:r>
+                <a:rPr lang="en-US" dirty="0" smtClean="0"/>
+                <a:t>10</a:t>
+              </a:r>
+              <a:endParaRPr lang="en-US" dirty="0"/>
+            </a:p>
+          </p:txBody>
+        </p:sp>
+      </p:grpSp>
     </p:spTree>
     <p:extLst>
       <p:ext uri="{BB962C8B-B14F-4D97-AF65-F5344CB8AC3E}">
-        <p14:creationId xmlns:p14="http://schemas.microsoft.com/office/powerpoint/2010/main" val="1795859511"/>
+        <p14:creationId xmlns:p14="http://schemas.microsoft.com/office/powerpoint/2010/main" val="1978346129"/>
       </p:ext>
     </p:extLst>
   </p:cSld>
@@ -10410,7 +11745,7 @@
             </a:r>
             <a:r>
               <a:rPr lang="en-US" dirty="0" smtClean="0"/>
-              <a:t> E1a</a:t>
+              <a:t> E1</a:t>
             </a:r>
             <a:endParaRPr lang="en-US" dirty="0"/>
           </a:p>
@@ -10428,104 +11763,62 @@
         </p:nvSpPr>
         <p:spPr/>
         <p:txBody>
-          <a:bodyPr>
-            <a:normAutofit fontScale="92500" lnSpcReduction="10000"/>
-          </a:bodyPr>
+          <a:bodyPr/>
           <a:lstStyle/>
           <a:p>
             <a:r>
-              <a:rPr lang="en-US" dirty="0" smtClean="0"/>
-              <a:t>This is a test for a topology that is modified by context events</a:t>
-            </a:r>
-          </a:p>
-          <a:p>
-            <a:r>
-              <a:rPr lang="en-US" dirty="0" smtClean="0"/>
-              <a:t>Initially: (k=1.5)</a:t>
+              <a:rPr lang="en-US" smtClean="0"/>
+              <a:t>Simple test case for e-ktc</a:t>
+            </a:r>
+          </a:p>
+          <a:p>
+            <a:r>
+              <a:rPr lang="en-US" smtClean="0"/>
+              <a:t>Cases (k=1.5)</a:t>
             </a:r>
           </a:p>
           <a:p>
             <a:pPr lvl="1"/>
             <a:r>
-              <a:rPr lang="en-US" dirty="0" smtClean="0"/>
-              <a:t>Only e13 inactive</a:t>
-            </a:r>
-          </a:p>
-          <a:p>
-            <a:r>
-              <a:rPr lang="en-US" dirty="0" smtClean="0"/>
-              <a:t>Context event: </a:t>
+              <a:rPr lang="en-US" smtClean="0"/>
+              <a:t>e13-e12-e23 =&gt; I</a:t>
             </a:r>
           </a:p>
           <a:p>
             <a:pPr lvl="1"/>
             <a:r>
-              <a:rPr lang="en-US" dirty="0"/>
-              <a:t>w</a:t>
-            </a:r>
-            <a:r>
-              <a:rPr lang="en-US" dirty="0" smtClean="0"/>
-              <a:t>(n3) := 15 -&gt; r(31) = 1.5, r(32) = 1</a:t>
-            </a:r>
-          </a:p>
-          <a:p>
-            <a:r>
-              <a:rPr lang="en-US" dirty="0" smtClean="0"/>
-              <a:t>Final state:</a:t>
+              <a:rPr lang="en-US" smtClean="0"/>
+              <a:t>e32-e21-e13 =&gt; A</a:t>
             </a:r>
           </a:p>
           <a:p>
             <a:pPr lvl="1"/>
             <a:r>
-              <a:rPr lang="en-US" dirty="0" smtClean="0"/>
-              <a:t>e13 I</a:t>
+              <a:rPr lang="en-US" smtClean="0"/>
+              <a:t>e21-e23-e31 =&gt; A</a:t>
             </a:r>
           </a:p>
           <a:p>
             <a:pPr lvl="1"/>
             <a:r>
-              <a:rPr lang="en-US" dirty="0" smtClean="0"/>
-              <a:t>e32 I</a:t>
+              <a:rPr lang="en-US" smtClean="0"/>
+              <a:t>e31-e32-e21 =&gt; A</a:t>
             </a:r>
           </a:p>
           <a:p>
             <a:pPr lvl="1"/>
             <a:r>
-              <a:rPr lang="en-US" dirty="0" smtClean="0"/>
-              <a:t>e21 A</a:t>
+              <a:rPr lang="en-US" smtClean="0"/>
+              <a:t>e12-e13-e32 =&gt; A</a:t>
             </a:r>
           </a:p>
           <a:p>
             <a:pPr lvl="1"/>
             <a:r>
-              <a:rPr lang="en-US" dirty="0" smtClean="0"/>
-              <a:t>e31 A</a:t>
-            </a:r>
-          </a:p>
-          <a:p>
-            <a:pPr lvl="1"/>
-            <a:r>
-              <a:rPr lang="en-US" dirty="0" smtClean="0"/>
-              <a:t>e12 A</a:t>
-            </a:r>
-          </a:p>
-          <a:p>
-            <a:pPr lvl="1"/>
-            <a:r>
-              <a:rPr lang="en-US" dirty="0" smtClean="0"/>
-              <a:t>e23 A</a:t>
-            </a:r>
-          </a:p>
-          <a:p>
-            <a:pPr lvl="1"/>
+              <a:rPr lang="en-US" smtClean="0"/>
+              <a:t>e23-e21-e13 =&gt; A</a:t>
+            </a:r>
             <a:endParaRPr lang="en-US" dirty="0" smtClean="0"/>
-          </a:p>
-          <a:p>
-            <a:pPr lvl="1"/>
-            <a:endParaRPr lang="en-US" dirty="0" smtClean="0"/>
-          </a:p>
-          <a:p>
-            <a:endParaRPr lang="en-US" dirty="0"/>
           </a:p>
         </p:txBody>
       </p:sp>
@@ -10791,6 +12084,753 @@
         </p:nvSpPr>
         <p:spPr>
           <a:xfrm>
+            <a:off x="7543860" y="1390910"/>
+            <a:ext cx="301686" cy="369332"/>
+          </a:xfrm>
+          <a:prstGeom prst="rect">
+            <a:avLst/>
+          </a:prstGeom>
+          <a:noFill/>
+        </p:spPr>
+        <p:txBody>
+          <a:bodyPr wrap="none" rtlCol="0">
+            <a:spAutoFit/>
+          </a:bodyPr>
+          <a:lstStyle/>
+          <a:p>
+            <a:r>
+              <a:rPr lang="en-US" dirty="0" smtClean="0"/>
+              <a:t>5</a:t>
+            </a:r>
+            <a:endParaRPr lang="en-US" dirty="0"/>
+          </a:p>
+        </p:txBody>
+      </p:sp>
+      <p:sp>
+        <p:nvSpPr>
+          <p:cNvPr id="11" name="Textfeld 10"/>
+          <p:cNvSpPr txBox="1"/>
+          <p:nvPr/>
+        </p:nvSpPr>
+        <p:spPr>
+          <a:xfrm>
+            <a:off x="9355214" y="1342806"/>
+            <a:ext cx="418704" cy="369332"/>
+          </a:xfrm>
+          <a:prstGeom prst="rect">
+            <a:avLst/>
+          </a:prstGeom>
+          <a:noFill/>
+        </p:spPr>
+        <p:txBody>
+          <a:bodyPr wrap="none" rtlCol="0">
+            <a:spAutoFit/>
+          </a:bodyPr>
+          <a:lstStyle/>
+          <a:p>
+            <a:r>
+              <a:rPr lang="en-US" dirty="0"/>
+              <a:t>1</a:t>
+            </a:r>
+            <a:r>
+              <a:rPr lang="en-US" dirty="0" smtClean="0"/>
+              <a:t>5</a:t>
+            </a:r>
+            <a:endParaRPr lang="en-US" dirty="0"/>
+          </a:p>
+        </p:txBody>
+      </p:sp>
+      <p:sp>
+        <p:nvSpPr>
+          <p:cNvPr id="12" name="Textfeld 11"/>
+          <p:cNvSpPr txBox="1"/>
+          <p:nvPr/>
+        </p:nvSpPr>
+        <p:spPr>
+          <a:xfrm>
+            <a:off x="8681033" y="2335981"/>
+            <a:ext cx="418704" cy="369332"/>
+          </a:xfrm>
+          <a:prstGeom prst="rect">
+            <a:avLst/>
+          </a:prstGeom>
+          <a:noFill/>
+        </p:spPr>
+        <p:txBody>
+          <a:bodyPr wrap="none" rtlCol="0">
+            <a:spAutoFit/>
+          </a:bodyPr>
+          <a:lstStyle/>
+          <a:p>
+            <a:r>
+              <a:rPr lang="en-US" dirty="0" smtClean="0"/>
+              <a:t>10</a:t>
+            </a:r>
+            <a:endParaRPr lang="en-US" dirty="0"/>
+          </a:p>
+        </p:txBody>
+      </p:sp>
+      <p:sp>
+        <p:nvSpPr>
+          <p:cNvPr id="13" name="Textfeld 12"/>
+          <p:cNvSpPr txBox="1"/>
+          <p:nvPr/>
+        </p:nvSpPr>
+        <p:spPr>
+          <a:xfrm>
+            <a:off x="6956441" y="2469261"/>
+            <a:ext cx="699230" cy="369332"/>
+          </a:xfrm>
+          <a:prstGeom prst="rect">
+            <a:avLst/>
+          </a:prstGeom>
+          <a:noFill/>
+        </p:spPr>
+        <p:txBody>
+          <a:bodyPr wrap="none" rtlCol="0">
+            <a:spAutoFit/>
+          </a:bodyPr>
+          <a:lstStyle/>
+          <a:p>
+            <a:r>
+              <a:rPr lang="en-US" dirty="0" smtClean="0"/>
+              <a:t>w=10</a:t>
+            </a:r>
+            <a:endParaRPr lang="en-US" dirty="0"/>
+          </a:p>
+        </p:txBody>
+      </p:sp>
+      <p:sp>
+        <p:nvSpPr>
+          <p:cNvPr id="14" name="Textfeld 13"/>
+          <p:cNvSpPr txBox="1"/>
+          <p:nvPr/>
+        </p:nvSpPr>
+        <p:spPr>
+          <a:xfrm>
+            <a:off x="8046441" y="439783"/>
+            <a:ext cx="699230" cy="369332"/>
+          </a:xfrm>
+          <a:prstGeom prst="rect">
+            <a:avLst/>
+          </a:prstGeom>
+          <a:noFill/>
+        </p:spPr>
+        <p:txBody>
+          <a:bodyPr wrap="none" rtlCol="0">
+            <a:spAutoFit/>
+          </a:bodyPr>
+          <a:lstStyle/>
+          <a:p>
+            <a:r>
+              <a:rPr lang="en-US" dirty="0" smtClean="0"/>
+              <a:t>w=30</a:t>
+            </a:r>
+            <a:endParaRPr lang="en-US" dirty="0"/>
+          </a:p>
+        </p:txBody>
+      </p:sp>
+      <p:sp>
+        <p:nvSpPr>
+          <p:cNvPr id="15" name="Textfeld 14"/>
+          <p:cNvSpPr txBox="1"/>
+          <p:nvPr/>
+        </p:nvSpPr>
+        <p:spPr>
+          <a:xfrm>
+            <a:off x="10386454" y="2240277"/>
+            <a:ext cx="699230" cy="369332"/>
+          </a:xfrm>
+          <a:prstGeom prst="rect">
+            <a:avLst/>
+          </a:prstGeom>
+          <a:noFill/>
+        </p:spPr>
+        <p:txBody>
+          <a:bodyPr wrap="none" rtlCol="0">
+            <a:spAutoFit/>
+          </a:bodyPr>
+          <a:lstStyle/>
+          <a:p>
+            <a:r>
+              <a:rPr lang="en-US" dirty="0" smtClean="0"/>
+              <a:t>w=60</a:t>
+            </a:r>
+            <a:endParaRPr lang="en-US" dirty="0"/>
+          </a:p>
+        </p:txBody>
+      </p:sp>
+      <p:sp>
+        <p:nvSpPr>
+          <p:cNvPr id="16" name="Textfeld 15"/>
+          <p:cNvSpPr txBox="1"/>
+          <p:nvPr/>
+        </p:nvSpPr>
+        <p:spPr>
+          <a:xfrm>
+            <a:off x="6469508" y="952603"/>
+            <a:ext cx="1093569" cy="646331"/>
+          </a:xfrm>
+          <a:prstGeom prst="rect">
+            <a:avLst/>
+          </a:prstGeom>
+          <a:noFill/>
+        </p:spPr>
+        <p:txBody>
+          <a:bodyPr wrap="none" rtlCol="0">
+            <a:spAutoFit/>
+          </a:bodyPr>
+          <a:lstStyle/>
+          <a:p>
+            <a:r>
+              <a:rPr lang="en-US" dirty="0"/>
+              <a:t>r(e12) = 2</a:t>
+            </a:r>
+            <a:endParaRPr lang="en-US" dirty="0" smtClean="0"/>
+          </a:p>
+          <a:p>
+            <a:pPr marL="0" lvl="1"/>
+            <a:r>
+              <a:rPr lang="en-US" dirty="0"/>
+              <a:t>r(e21) = </a:t>
+            </a:r>
+            <a:r>
+              <a:rPr lang="en-US" dirty="0" smtClean="0"/>
+              <a:t>6</a:t>
+            </a:r>
+            <a:endParaRPr lang="en-US" dirty="0"/>
+          </a:p>
+        </p:txBody>
+      </p:sp>
+      <p:sp>
+        <p:nvSpPr>
+          <p:cNvPr id="17" name="Textfeld 16"/>
+          <p:cNvSpPr txBox="1"/>
+          <p:nvPr/>
+        </p:nvSpPr>
+        <p:spPr>
+          <a:xfrm>
+            <a:off x="8343482" y="2653927"/>
+            <a:ext cx="1093569" cy="646331"/>
+          </a:xfrm>
+          <a:prstGeom prst="rect">
+            <a:avLst/>
+          </a:prstGeom>
+          <a:noFill/>
+        </p:spPr>
+        <p:txBody>
+          <a:bodyPr wrap="none" rtlCol="0">
+            <a:spAutoFit/>
+          </a:bodyPr>
+          <a:lstStyle/>
+          <a:p>
+            <a:r>
+              <a:rPr lang="en-US" dirty="0"/>
+              <a:t>r(e13) = </a:t>
+            </a:r>
+            <a:r>
+              <a:rPr lang="en-US" dirty="0" smtClean="0"/>
+              <a:t>1</a:t>
+            </a:r>
+          </a:p>
+          <a:p>
+            <a:pPr marL="0" lvl="1"/>
+            <a:r>
+              <a:rPr lang="en-US" dirty="0"/>
+              <a:t>r(e31) = </a:t>
+            </a:r>
+            <a:r>
+              <a:rPr lang="en-US" dirty="0" smtClean="0"/>
+              <a:t>6</a:t>
+            </a:r>
+            <a:endParaRPr lang="en-US" dirty="0"/>
+          </a:p>
+        </p:txBody>
+      </p:sp>
+      <p:sp>
+        <p:nvSpPr>
+          <p:cNvPr id="18" name="Textfeld 17"/>
+          <p:cNvSpPr txBox="1"/>
+          <p:nvPr/>
+        </p:nvSpPr>
+        <p:spPr>
+          <a:xfrm>
+            <a:off x="9829580" y="974463"/>
+            <a:ext cx="1093569" cy="646331"/>
+          </a:xfrm>
+          <a:prstGeom prst="rect">
+            <a:avLst/>
+          </a:prstGeom>
+          <a:noFill/>
+        </p:spPr>
+        <p:txBody>
+          <a:bodyPr wrap="none" rtlCol="0">
+            <a:spAutoFit/>
+          </a:bodyPr>
+          <a:lstStyle/>
+          <a:p>
+            <a:r>
+              <a:rPr lang="en-US" dirty="0"/>
+              <a:t>r(e23) = </a:t>
+            </a:r>
+            <a:r>
+              <a:rPr lang="en-US" dirty="0" smtClean="0"/>
+              <a:t>2</a:t>
+            </a:r>
+          </a:p>
+          <a:p>
+            <a:pPr marL="0" lvl="1"/>
+            <a:r>
+              <a:rPr lang="en-US" dirty="0"/>
+              <a:t>r(e32) = </a:t>
+            </a:r>
+            <a:r>
+              <a:rPr lang="en-US" dirty="0" smtClean="0"/>
+              <a:t>4</a:t>
+            </a:r>
+            <a:endParaRPr lang="en-US" dirty="0"/>
+          </a:p>
+        </p:txBody>
+      </p:sp>
+    </p:spTree>
+    <p:extLst>
+      <p:ext uri="{BB962C8B-B14F-4D97-AF65-F5344CB8AC3E}">
+        <p14:creationId xmlns:p14="http://schemas.microsoft.com/office/powerpoint/2010/main" val="1795859511"/>
+      </p:ext>
+    </p:extLst>
+  </p:cSld>
+  <p:clrMapOvr>
+    <a:masterClrMapping/>
+  </p:clrMapOvr>
+  <p:timing>
+    <p:tnLst>
+      <p:par>
+        <p:cTn id="1" dur="indefinite" restart="never" nodeType="tmRoot"/>
+      </p:par>
+    </p:tnLst>
+  </p:timing>
+</p:sld>
+</file>
+
+<file path=ppt/slides/slide15.xml><?xml version="1.0" encoding="utf-8"?>
+<p:sld xmlns:a="http://schemas.openxmlformats.org/drawingml/2006/main" xmlns:r="http://schemas.openxmlformats.org/officeDocument/2006/relationships" xmlns:p="http://schemas.openxmlformats.org/presentationml/2006/main">
+  <p:cSld>
+    <p:spTree>
+      <p:nvGrpSpPr>
+        <p:cNvPr id="1" name=""/>
+        <p:cNvGrpSpPr/>
+        <p:nvPr/>
+      </p:nvGrpSpPr>
+      <p:grpSpPr>
+        <a:xfrm>
+          <a:off x="0" y="0"/>
+          <a:ext cx="0" cy="0"/>
+          <a:chOff x="0" y="0"/>
+          <a:chExt cx="0" cy="0"/>
+        </a:xfrm>
+      </p:grpSpPr>
+      <p:sp>
+        <p:nvSpPr>
+          <p:cNvPr id="2" name="Titel 1"/>
+          <p:cNvSpPr>
+            <a:spLocks noGrp="1"/>
+          </p:cNvSpPr>
+          <p:nvPr>
+            <p:ph type="title"/>
+          </p:nvPr>
+        </p:nvSpPr>
+        <p:spPr/>
+        <p:txBody>
+          <a:bodyPr/>
+          <a:lstStyle/>
+          <a:p>
+            <a:r>
+              <a:rPr lang="en-US" dirty="0" err="1" smtClean="0"/>
+              <a:t>Testgraph</a:t>
+            </a:r>
+            <a:r>
+              <a:rPr lang="en-US" dirty="0" smtClean="0"/>
+              <a:t> E1a</a:t>
+            </a:r>
+            <a:endParaRPr lang="en-US" dirty="0"/>
+          </a:p>
+        </p:txBody>
+      </p:sp>
+      <p:sp>
+        <p:nvSpPr>
+          <p:cNvPr id="3" name="Inhaltsplatzhalter 2"/>
+          <p:cNvSpPr>
+            <a:spLocks noGrp="1"/>
+          </p:cNvSpPr>
+          <p:nvPr>
+            <p:ph idx="1"/>
+          </p:nvPr>
+        </p:nvSpPr>
+        <p:spPr/>
+        <p:txBody>
+          <a:bodyPr>
+            <a:normAutofit fontScale="92500" lnSpcReduction="10000"/>
+          </a:bodyPr>
+          <a:lstStyle/>
+          <a:p>
+            <a:r>
+              <a:rPr lang="en-US" dirty="0" smtClean="0"/>
+              <a:t>This is a test for a topology that is modified by context events</a:t>
+            </a:r>
+          </a:p>
+          <a:p>
+            <a:r>
+              <a:rPr lang="en-US" dirty="0" smtClean="0"/>
+              <a:t>Initially: (k=1.5)</a:t>
+            </a:r>
+          </a:p>
+          <a:p>
+            <a:pPr lvl="1"/>
+            <a:r>
+              <a:rPr lang="en-US" dirty="0" smtClean="0"/>
+              <a:t>Only e13 inactive</a:t>
+            </a:r>
+          </a:p>
+          <a:p>
+            <a:r>
+              <a:rPr lang="en-US" dirty="0" smtClean="0"/>
+              <a:t>Context event: </a:t>
+            </a:r>
+          </a:p>
+          <a:p>
+            <a:pPr lvl="1"/>
+            <a:r>
+              <a:rPr lang="en-US" dirty="0"/>
+              <a:t>w</a:t>
+            </a:r>
+            <a:r>
+              <a:rPr lang="en-US" dirty="0" smtClean="0"/>
+              <a:t>(n3) := 15 -&gt; r(31) = 1.5, r(32) = 1</a:t>
+            </a:r>
+          </a:p>
+          <a:p>
+            <a:r>
+              <a:rPr lang="en-US" dirty="0" smtClean="0"/>
+              <a:t>Final state:</a:t>
+            </a:r>
+          </a:p>
+          <a:p>
+            <a:pPr lvl="1"/>
+            <a:r>
+              <a:rPr lang="en-US" dirty="0" smtClean="0"/>
+              <a:t>e13 I</a:t>
+            </a:r>
+          </a:p>
+          <a:p>
+            <a:pPr lvl="1"/>
+            <a:r>
+              <a:rPr lang="en-US" dirty="0" smtClean="0"/>
+              <a:t>e32 I</a:t>
+            </a:r>
+          </a:p>
+          <a:p>
+            <a:pPr lvl="1"/>
+            <a:r>
+              <a:rPr lang="en-US" dirty="0" smtClean="0"/>
+              <a:t>e21 A</a:t>
+            </a:r>
+          </a:p>
+          <a:p>
+            <a:pPr lvl="1"/>
+            <a:r>
+              <a:rPr lang="en-US" dirty="0" smtClean="0"/>
+              <a:t>e31 A</a:t>
+            </a:r>
+          </a:p>
+          <a:p>
+            <a:pPr lvl="1"/>
+            <a:r>
+              <a:rPr lang="en-US" dirty="0" smtClean="0"/>
+              <a:t>e12 A</a:t>
+            </a:r>
+          </a:p>
+          <a:p>
+            <a:pPr lvl="1"/>
+            <a:r>
+              <a:rPr lang="en-US" dirty="0" smtClean="0"/>
+              <a:t>e23 A</a:t>
+            </a:r>
+          </a:p>
+          <a:p>
+            <a:pPr lvl="1"/>
+            <a:endParaRPr lang="en-US" dirty="0" smtClean="0"/>
+          </a:p>
+          <a:p>
+            <a:pPr lvl="1"/>
+            <a:endParaRPr lang="en-US" dirty="0" smtClean="0"/>
+          </a:p>
+          <a:p>
+            <a:endParaRPr lang="en-US" dirty="0"/>
+          </a:p>
+        </p:txBody>
+      </p:sp>
+      <p:sp>
+        <p:nvSpPr>
+          <p:cNvPr id="4" name="Ellipse 3"/>
+          <p:cNvSpPr/>
+          <p:nvPr/>
+        </p:nvSpPr>
+        <p:spPr>
+          <a:xfrm>
+            <a:off x="7301925" y="2144069"/>
+            <a:ext cx="328474" cy="328474"/>
+          </a:xfrm>
+          <a:prstGeom prst="ellipse">
+            <a:avLst/>
+          </a:prstGeom>
+          <a:solidFill>
+            <a:schemeClr val="tx1"/>
+          </a:solidFill>
+        </p:spPr>
+        <p:style>
+          <a:lnRef idx="2">
+            <a:schemeClr val="accent1">
+              <a:shade val="50000"/>
+            </a:schemeClr>
+          </a:lnRef>
+          <a:fillRef idx="1">
+            <a:schemeClr val="accent1"/>
+          </a:fillRef>
+          <a:effectRef idx="0">
+            <a:schemeClr val="accent1"/>
+          </a:effectRef>
+          <a:fontRef idx="minor">
+            <a:schemeClr val="lt1"/>
+          </a:fontRef>
+        </p:style>
+        <p:txBody>
+          <a:bodyPr rtlCol="0" anchor="ctr"/>
+          <a:lstStyle/>
+          <a:p>
+            <a:pPr algn="ctr"/>
+            <a:r>
+              <a:rPr lang="en-US" dirty="0" smtClean="0"/>
+              <a:t>1</a:t>
+            </a:r>
+            <a:endParaRPr lang="en-US" dirty="0"/>
+          </a:p>
+        </p:txBody>
+      </p:sp>
+      <p:sp>
+        <p:nvSpPr>
+          <p:cNvPr id="5" name="Ellipse 4"/>
+          <p:cNvSpPr/>
+          <p:nvPr/>
+        </p:nvSpPr>
+        <p:spPr>
+          <a:xfrm>
+            <a:off x="8231819" y="845564"/>
+            <a:ext cx="328474" cy="328474"/>
+          </a:xfrm>
+          <a:prstGeom prst="ellipse">
+            <a:avLst/>
+          </a:prstGeom>
+          <a:solidFill>
+            <a:schemeClr val="tx1"/>
+          </a:solidFill>
+        </p:spPr>
+        <p:style>
+          <a:lnRef idx="2">
+            <a:schemeClr val="accent1">
+              <a:shade val="50000"/>
+            </a:schemeClr>
+          </a:lnRef>
+          <a:fillRef idx="1">
+            <a:schemeClr val="accent1"/>
+          </a:fillRef>
+          <a:effectRef idx="0">
+            <a:schemeClr val="accent1"/>
+          </a:effectRef>
+          <a:fontRef idx="minor">
+            <a:schemeClr val="lt1"/>
+          </a:fontRef>
+        </p:style>
+        <p:txBody>
+          <a:bodyPr rtlCol="0" anchor="ctr"/>
+          <a:lstStyle/>
+          <a:p>
+            <a:pPr algn="ctr"/>
+            <a:r>
+              <a:rPr lang="en-US" dirty="0"/>
+              <a:t>2</a:t>
+            </a:r>
+          </a:p>
+        </p:txBody>
+      </p:sp>
+      <p:sp>
+        <p:nvSpPr>
+          <p:cNvPr id="6" name="Ellipse 5"/>
+          <p:cNvSpPr/>
+          <p:nvPr/>
+        </p:nvSpPr>
+        <p:spPr>
+          <a:xfrm>
+            <a:off x="10150136" y="2192173"/>
+            <a:ext cx="328474" cy="328474"/>
+          </a:xfrm>
+          <a:prstGeom prst="ellipse">
+            <a:avLst/>
+          </a:prstGeom>
+          <a:solidFill>
+            <a:schemeClr val="tx1"/>
+          </a:solidFill>
+        </p:spPr>
+        <p:style>
+          <a:lnRef idx="2">
+            <a:schemeClr val="accent1">
+              <a:shade val="50000"/>
+            </a:schemeClr>
+          </a:lnRef>
+          <a:fillRef idx="1">
+            <a:schemeClr val="accent1"/>
+          </a:fillRef>
+          <a:effectRef idx="0">
+            <a:schemeClr val="accent1"/>
+          </a:effectRef>
+          <a:fontRef idx="minor">
+            <a:schemeClr val="lt1"/>
+          </a:fontRef>
+        </p:style>
+        <p:txBody>
+          <a:bodyPr rtlCol="0" anchor="ctr"/>
+          <a:lstStyle/>
+          <a:p>
+            <a:pPr algn="ctr"/>
+            <a:r>
+              <a:rPr lang="en-US" dirty="0" smtClean="0"/>
+              <a:t>3</a:t>
+            </a:r>
+            <a:endParaRPr lang="en-US" dirty="0"/>
+          </a:p>
+        </p:txBody>
+      </p:sp>
+      <p:cxnSp>
+        <p:nvCxnSpPr>
+          <p:cNvPr id="7" name="Gerader Verbinder 6"/>
+          <p:cNvCxnSpPr>
+            <a:stCxn id="4" idx="7"/>
+            <a:endCxn id="5" idx="3"/>
+          </p:cNvCxnSpPr>
+          <p:nvPr/>
+        </p:nvCxnSpPr>
+        <p:spPr>
+          <a:xfrm flipV="1">
+            <a:off x="7582295" y="1125934"/>
+            <a:ext cx="697628" cy="1066239"/>
+          </a:xfrm>
+          <a:prstGeom prst="line">
+            <a:avLst/>
+          </a:prstGeom>
+          <a:ln w="38100">
+            <a:solidFill>
+              <a:schemeClr val="tx1"/>
+            </a:solidFill>
+          </a:ln>
+        </p:spPr>
+        <p:style>
+          <a:lnRef idx="1">
+            <a:schemeClr val="accent1"/>
+          </a:lnRef>
+          <a:fillRef idx="0">
+            <a:schemeClr val="accent1"/>
+          </a:fillRef>
+          <a:effectRef idx="0">
+            <a:schemeClr val="accent1"/>
+          </a:effectRef>
+          <a:fontRef idx="minor">
+            <a:schemeClr val="tx1"/>
+          </a:fontRef>
+        </p:style>
+      </p:cxnSp>
+      <p:cxnSp>
+        <p:nvCxnSpPr>
+          <p:cNvPr id="8" name="Gerader Verbinder 7"/>
+          <p:cNvCxnSpPr>
+            <a:stCxn id="6" idx="1"/>
+            <a:endCxn id="5" idx="5"/>
+          </p:cNvCxnSpPr>
+          <p:nvPr/>
+        </p:nvCxnSpPr>
+        <p:spPr>
+          <a:xfrm flipH="1" flipV="1">
+            <a:off x="8512189" y="1125934"/>
+            <a:ext cx="1686051" cy="1114343"/>
+          </a:xfrm>
+          <a:prstGeom prst="line">
+            <a:avLst/>
+          </a:prstGeom>
+          <a:ln w="38100">
+            <a:solidFill>
+              <a:schemeClr val="tx1"/>
+            </a:solidFill>
+          </a:ln>
+        </p:spPr>
+        <p:style>
+          <a:lnRef idx="1">
+            <a:schemeClr val="accent1"/>
+          </a:lnRef>
+          <a:fillRef idx="0">
+            <a:schemeClr val="accent1"/>
+          </a:fillRef>
+          <a:effectRef idx="0">
+            <a:schemeClr val="accent1"/>
+          </a:effectRef>
+          <a:fontRef idx="minor">
+            <a:schemeClr val="tx1"/>
+          </a:fontRef>
+        </p:style>
+      </p:cxnSp>
+      <p:cxnSp>
+        <p:nvCxnSpPr>
+          <p:cNvPr id="9" name="Gerader Verbinder 8"/>
+          <p:cNvCxnSpPr>
+            <a:stCxn id="6" idx="2"/>
+            <a:endCxn id="4" idx="6"/>
+          </p:cNvCxnSpPr>
+          <p:nvPr/>
+        </p:nvCxnSpPr>
+        <p:spPr>
+          <a:xfrm flipH="1" flipV="1">
+            <a:off x="7630399" y="2308306"/>
+            <a:ext cx="2519737" cy="48104"/>
+          </a:xfrm>
+          <a:prstGeom prst="line">
+            <a:avLst/>
+          </a:prstGeom>
+          <a:ln w="38100">
+            <a:solidFill>
+              <a:schemeClr val="tx1"/>
+            </a:solidFill>
+          </a:ln>
+        </p:spPr>
+        <p:style>
+          <a:lnRef idx="1">
+            <a:schemeClr val="accent1"/>
+          </a:lnRef>
+          <a:fillRef idx="0">
+            <a:schemeClr val="accent1"/>
+          </a:fillRef>
+          <a:effectRef idx="0">
+            <a:schemeClr val="accent1"/>
+          </a:effectRef>
+          <a:fontRef idx="minor">
+            <a:schemeClr val="tx1"/>
+          </a:fontRef>
+        </p:style>
+      </p:cxnSp>
+      <p:sp>
+        <p:nvSpPr>
+          <p:cNvPr id="10" name="Textfeld 9"/>
+          <p:cNvSpPr txBox="1"/>
+          <p:nvPr/>
+        </p:nvSpPr>
+        <p:spPr>
+          <a:xfrm>
             <a:off x="7330453" y="1551899"/>
             <a:ext cx="538930" cy="369332"/>
           </a:xfrm>
@@ -11719,7 +13759,7 @@
 </p:sld>
 </file>
 
-<file path=ppt/slides/slide15.xml><?xml version="1.0" encoding="utf-8"?>
+<file path=ppt/slides/slide16.xml><?xml version="1.0" encoding="utf-8"?>
 <p:sld xmlns:a="http://schemas.openxmlformats.org/drawingml/2006/main" xmlns:r="http://schemas.openxmlformats.org/officeDocument/2006/relationships" xmlns:p="http://schemas.openxmlformats.org/presentationml/2006/main">
   <p:cSld>
     <p:spTree>

</xml_diff>